<commit_message>
added generalization of cars and car sizes
</commit_message>
<xml_diff>
--- a/modelGraphics/model1Graphic.pptx
+++ b/modelGraphics/model1Graphic.pptx
@@ -6,6 +6,7 @@
   </p:sldMasterIdLst>
   <p:sldIdLst>
     <p:sldId id="256" r:id="rId2"/>
+    <p:sldId id="257" r:id="rId3"/>
   </p:sldIdLst>
   <p:sldSz cx="12192000" cy="6858000"/>
   <p:notesSz cx="6858000" cy="9144000"/>
@@ -104,6 +105,11 @@
       </a:defRPr>
     </a:lvl9pPr>
   </p:defaultTextStyle>
+  <p:extLst>
+    <p:ext uri="{EFAFB233-063F-42B5-8137-9DF3F51BA10A}">
+      <p15:sldGuideLst xmlns:p15="http://schemas.microsoft.com/office/powerpoint/2012/main"/>
+    </p:ext>
+  </p:extLst>
 </p:presentation>
 </file>
 
@@ -254,7 +260,7 @@
           <a:p>
             <a:fld id="{F94D9435-25AA-5648-9159-647FA840B580}" type="datetimeFigureOut">
               <a:rPr lang="en-US" smtClean="0"/>
-              <a:t>4/18/20</a:t>
+              <a:t>4/22/20</a:t>
             </a:fld>
             <a:endParaRPr lang="en-US"/>
           </a:p>
@@ -452,7 +458,7 @@
           <a:p>
             <a:fld id="{F94D9435-25AA-5648-9159-647FA840B580}" type="datetimeFigureOut">
               <a:rPr lang="en-US" smtClean="0"/>
-              <a:t>4/18/20</a:t>
+              <a:t>4/22/20</a:t>
             </a:fld>
             <a:endParaRPr lang="en-US"/>
           </a:p>
@@ -660,7 +666,7 @@
           <a:p>
             <a:fld id="{F94D9435-25AA-5648-9159-647FA840B580}" type="datetimeFigureOut">
               <a:rPr lang="en-US" smtClean="0"/>
-              <a:t>4/18/20</a:t>
+              <a:t>4/22/20</a:t>
             </a:fld>
             <a:endParaRPr lang="en-US"/>
           </a:p>
@@ -858,7 +864,7 @@
           <a:p>
             <a:fld id="{F94D9435-25AA-5648-9159-647FA840B580}" type="datetimeFigureOut">
               <a:rPr lang="en-US" smtClean="0"/>
-              <a:t>4/18/20</a:t>
+              <a:t>4/22/20</a:t>
             </a:fld>
             <a:endParaRPr lang="en-US"/>
           </a:p>
@@ -1133,7 +1139,7 @@
           <a:p>
             <a:fld id="{F94D9435-25AA-5648-9159-647FA840B580}" type="datetimeFigureOut">
               <a:rPr lang="en-US" smtClean="0"/>
-              <a:t>4/18/20</a:t>
+              <a:t>4/22/20</a:t>
             </a:fld>
             <a:endParaRPr lang="en-US"/>
           </a:p>
@@ -1398,7 +1404,7 @@
           <a:p>
             <a:fld id="{F94D9435-25AA-5648-9159-647FA840B580}" type="datetimeFigureOut">
               <a:rPr lang="en-US" smtClean="0"/>
-              <a:t>4/18/20</a:t>
+              <a:t>4/22/20</a:t>
             </a:fld>
             <a:endParaRPr lang="en-US"/>
           </a:p>
@@ -1810,7 +1816,7 @@
           <a:p>
             <a:fld id="{F94D9435-25AA-5648-9159-647FA840B580}" type="datetimeFigureOut">
               <a:rPr lang="en-US" smtClean="0"/>
-              <a:t>4/18/20</a:t>
+              <a:t>4/22/20</a:t>
             </a:fld>
             <a:endParaRPr lang="en-US"/>
           </a:p>
@@ -1951,7 +1957,7 @@
           <a:p>
             <a:fld id="{F94D9435-25AA-5648-9159-647FA840B580}" type="datetimeFigureOut">
               <a:rPr lang="en-US" smtClean="0"/>
-              <a:t>4/18/20</a:t>
+              <a:t>4/22/20</a:t>
             </a:fld>
             <a:endParaRPr lang="en-US"/>
           </a:p>
@@ -2064,7 +2070,7 @@
           <a:p>
             <a:fld id="{F94D9435-25AA-5648-9159-647FA840B580}" type="datetimeFigureOut">
               <a:rPr lang="en-US" smtClean="0"/>
-              <a:t>4/18/20</a:t>
+              <a:t>4/22/20</a:t>
             </a:fld>
             <a:endParaRPr lang="en-US"/>
           </a:p>
@@ -2375,7 +2381,7 @@
           <a:p>
             <a:fld id="{F94D9435-25AA-5648-9159-647FA840B580}" type="datetimeFigureOut">
               <a:rPr lang="en-US" smtClean="0"/>
-              <a:t>4/18/20</a:t>
+              <a:t>4/22/20</a:t>
             </a:fld>
             <a:endParaRPr lang="en-US"/>
           </a:p>
@@ -2663,7 +2669,7 @@
           <a:p>
             <a:fld id="{F94D9435-25AA-5648-9159-647FA840B580}" type="datetimeFigureOut">
               <a:rPr lang="en-US" smtClean="0"/>
-              <a:t>4/18/20</a:t>
+              <a:t>4/22/20</a:t>
             </a:fld>
             <a:endParaRPr lang="en-US"/>
           </a:p>
@@ -2904,7 +2910,7 @@
           <a:p>
             <a:fld id="{F94D9435-25AA-5648-9159-647FA840B580}" type="datetimeFigureOut">
               <a:rPr lang="en-US" smtClean="0"/>
-              <a:t>4/18/20</a:t>
+              <a:t>4/22/20</a:t>
             </a:fld>
             <a:endParaRPr lang="en-US"/>
           </a:p>
@@ -4181,328 +4187,2274 @@
           </a:graphicData>
         </a:graphic>
       </p:graphicFrame>
-      <p:sp>
-        <p:nvSpPr>
-          <p:cNvPr id="5" name="Rectangle 4">
-            <a:extLst>
-              <a:ext uri="{FF2B5EF4-FFF2-40B4-BE49-F238E27FC236}">
-                <a16:creationId xmlns:a16="http://schemas.microsoft.com/office/drawing/2014/main" id="{801C7FAF-8240-0B41-BF04-B6271D4AF5C3}"/>
-              </a:ext>
-            </a:extLst>
-          </p:cNvPr>
-          <p:cNvSpPr/>
+      <p:grpSp>
+        <p:nvGrpSpPr>
+          <p:cNvPr id="3" name="Group 2">
+            <a:extLst>
+              <a:ext uri="{FF2B5EF4-FFF2-40B4-BE49-F238E27FC236}">
+                <a16:creationId xmlns:a16="http://schemas.microsoft.com/office/drawing/2014/main" id="{88CD508B-9055-C842-B204-EE303FC072FE}"/>
+              </a:ext>
+            </a:extLst>
+          </p:cNvPr>
+          <p:cNvGrpSpPr/>
           <p:nvPr/>
-        </p:nvSpPr>
-        <p:spPr>
+        </p:nvGrpSpPr>
+        <p:grpSpPr>
           <a:xfrm>
             <a:off x="3170712" y="2185062"/>
-            <a:ext cx="1387434" cy="938150"/>
+            <a:ext cx="2444338" cy="938150"/>
+            <a:chOff x="3170712" y="2185062"/>
+            <a:chExt cx="2444338" cy="938150"/>
           </a:xfrm>
-          <a:prstGeom prst="rect">
-            <a:avLst/>
-          </a:prstGeom>
-          <a:solidFill>
-            <a:srgbClr val="FF0000"/>
-          </a:solidFill>
-          <a:ln>
+        </p:grpSpPr>
+        <p:sp>
+          <p:nvSpPr>
+            <p:cNvPr id="5" name="Rectangle 4">
+              <a:extLst>
+                <a:ext uri="{FF2B5EF4-FFF2-40B4-BE49-F238E27FC236}">
+                  <a16:creationId xmlns:a16="http://schemas.microsoft.com/office/drawing/2014/main" id="{801C7FAF-8240-0B41-BF04-B6271D4AF5C3}"/>
+                </a:ext>
+              </a:extLst>
+            </p:cNvPr>
+            <p:cNvSpPr/>
+            <p:nvPr/>
+          </p:nvSpPr>
+          <p:spPr>
+            <a:xfrm>
+              <a:off x="3170712" y="2185062"/>
+              <a:ext cx="1387434" cy="938150"/>
+            </a:xfrm>
+            <a:prstGeom prst="rect">
+              <a:avLst/>
+            </a:prstGeom>
+            <a:solidFill>
+              <a:srgbClr val="FF0000"/>
+            </a:solidFill>
+            <a:ln>
+              <a:solidFill>
+                <a:schemeClr val="tx1"/>
+              </a:solidFill>
+            </a:ln>
+          </p:spPr>
+          <p:style>
+            <a:lnRef idx="2">
+              <a:schemeClr val="accent1">
+                <a:shade val="50000"/>
+              </a:schemeClr>
+            </a:lnRef>
+            <a:fillRef idx="1">
+              <a:schemeClr val="accent1"/>
+            </a:fillRef>
+            <a:effectRef idx="0">
+              <a:schemeClr val="accent1"/>
+            </a:effectRef>
+            <a:fontRef idx="minor">
+              <a:schemeClr val="lt1"/>
+            </a:fontRef>
+          </p:style>
+          <p:txBody>
+            <a:bodyPr rtlCol="0" anchor="ctr"/>
+            <a:lstStyle/>
+            <a:p>
+              <a:pPr algn="ctr"/>
+              <a:endParaRPr lang="en-US" dirty="0"/>
+            </a:p>
+          </p:txBody>
+        </p:sp>
+        <p:sp>
+          <p:nvSpPr>
+            <p:cNvPr id="6" name="Rectangle 5">
+              <a:extLst>
+                <a:ext uri="{FF2B5EF4-FFF2-40B4-BE49-F238E27FC236}">
+                  <a16:creationId xmlns:a16="http://schemas.microsoft.com/office/drawing/2014/main" id="{89F8F10A-3CAD-7743-8513-6BF3E7AFA0E2}"/>
+                </a:ext>
+              </a:extLst>
+            </p:cNvPr>
+            <p:cNvSpPr/>
+            <p:nvPr/>
+          </p:nvSpPr>
+          <p:spPr>
+            <a:xfrm>
+              <a:off x="4558146" y="2220687"/>
+              <a:ext cx="1056904" cy="866166"/>
+            </a:xfrm>
+            <a:prstGeom prst="rect">
+              <a:avLst/>
+            </a:prstGeom>
+            <a:solidFill>
+              <a:srgbClr val="FF0000"/>
+            </a:solidFill>
+            <a:ln>
+              <a:solidFill>
+                <a:schemeClr val="tx1"/>
+              </a:solidFill>
+            </a:ln>
+          </p:spPr>
+          <p:style>
+            <a:lnRef idx="2">
+              <a:schemeClr val="accent1">
+                <a:shade val="50000"/>
+              </a:schemeClr>
+            </a:lnRef>
+            <a:fillRef idx="1">
+              <a:schemeClr val="accent1"/>
+            </a:fillRef>
+            <a:effectRef idx="0">
+              <a:schemeClr val="accent1"/>
+            </a:effectRef>
+            <a:fontRef idx="minor">
+              <a:schemeClr val="lt1"/>
+            </a:fontRef>
+          </p:style>
+          <p:txBody>
+            <a:bodyPr rtlCol="0" anchor="ctr"/>
+            <a:lstStyle/>
+            <a:p>
+              <a:pPr algn="ctr"/>
+              <a:endParaRPr lang="en-US" dirty="0"/>
+            </a:p>
+          </p:txBody>
+        </p:sp>
+      </p:grpSp>
+      <p:grpSp>
+        <p:nvGrpSpPr>
+          <p:cNvPr id="11" name="Group 10">
+            <a:extLst>
+              <a:ext uri="{FF2B5EF4-FFF2-40B4-BE49-F238E27FC236}">
+                <a16:creationId xmlns:a16="http://schemas.microsoft.com/office/drawing/2014/main" id="{35702F62-531C-124C-9EA0-2E6DAC982FB9}"/>
+              </a:ext>
+            </a:extLst>
+          </p:cNvPr>
+          <p:cNvGrpSpPr/>
+          <p:nvPr/>
+        </p:nvGrpSpPr>
+        <p:grpSpPr>
+          <a:xfrm>
+            <a:off x="5993080" y="2096008"/>
+            <a:ext cx="1056904" cy="1989104"/>
+            <a:chOff x="5993080" y="2096008"/>
+            <a:chExt cx="1056904" cy="1989104"/>
+          </a:xfrm>
+        </p:grpSpPr>
+        <p:sp>
+          <p:nvSpPr>
+            <p:cNvPr id="7" name="Rectangle 6">
+              <a:extLst>
+                <a:ext uri="{FF2B5EF4-FFF2-40B4-BE49-F238E27FC236}">
+                  <a16:creationId xmlns:a16="http://schemas.microsoft.com/office/drawing/2014/main" id="{3FBCBF7C-1BFE-A344-A88E-9F2152E614BE}"/>
+                </a:ext>
+              </a:extLst>
+            </p:cNvPr>
+            <p:cNvSpPr/>
+            <p:nvPr/>
+          </p:nvSpPr>
+          <p:spPr>
+            <a:xfrm>
+              <a:off x="6060375" y="3239004"/>
+              <a:ext cx="953984" cy="846108"/>
+            </a:xfrm>
+            <a:prstGeom prst="rect">
+              <a:avLst/>
+            </a:prstGeom>
             <a:solidFill>
               <a:schemeClr val="tx1"/>
             </a:solidFill>
-          </a:ln>
-        </p:spPr>
-        <p:style>
-          <a:lnRef idx="2">
-            <a:schemeClr val="accent1">
-              <a:shade val="50000"/>
-            </a:schemeClr>
-          </a:lnRef>
-          <a:fillRef idx="1">
-            <a:schemeClr val="accent1"/>
-          </a:fillRef>
-          <a:effectRef idx="0">
-            <a:schemeClr val="accent1"/>
-          </a:effectRef>
-          <a:fontRef idx="minor">
-            <a:schemeClr val="lt1"/>
-          </a:fontRef>
-        </p:style>
-        <p:txBody>
-          <a:bodyPr rtlCol="0" anchor="ctr"/>
-          <a:lstStyle/>
-          <a:p>
-            <a:pPr algn="ctr"/>
-            <a:endParaRPr lang="en-US" dirty="0"/>
-          </a:p>
-        </p:txBody>
-      </p:sp>
-      <p:sp>
-        <p:nvSpPr>
-          <p:cNvPr id="6" name="Rectangle 5">
-            <a:extLst>
-              <a:ext uri="{FF2B5EF4-FFF2-40B4-BE49-F238E27FC236}">
-                <a16:creationId xmlns:a16="http://schemas.microsoft.com/office/drawing/2014/main" id="{89F8F10A-3CAD-7743-8513-6BF3E7AFA0E2}"/>
-              </a:ext>
-            </a:extLst>
-          </p:cNvPr>
-          <p:cNvSpPr/>
-          <p:nvPr/>
-        </p:nvSpPr>
-        <p:spPr>
-          <a:xfrm>
-            <a:off x="4558146" y="2220687"/>
-            <a:ext cx="1056904" cy="866166"/>
-          </a:xfrm>
-          <a:prstGeom prst="rect">
-            <a:avLst/>
-          </a:prstGeom>
-          <a:solidFill>
-            <a:srgbClr val="FF0000"/>
-          </a:solidFill>
-          <a:ln>
+            <a:ln>
+              <a:solidFill>
+                <a:schemeClr val="tx1"/>
+              </a:solidFill>
+            </a:ln>
+          </p:spPr>
+          <p:style>
+            <a:lnRef idx="2">
+              <a:schemeClr val="accent1">
+                <a:shade val="50000"/>
+              </a:schemeClr>
+            </a:lnRef>
+            <a:fillRef idx="1">
+              <a:schemeClr val="accent1"/>
+            </a:fillRef>
+            <a:effectRef idx="0">
+              <a:schemeClr val="accent1"/>
+            </a:effectRef>
+            <a:fontRef idx="minor">
+              <a:schemeClr val="lt1"/>
+            </a:fontRef>
+          </p:style>
+          <p:txBody>
+            <a:bodyPr rtlCol="0" anchor="ctr"/>
+            <a:lstStyle/>
+            <a:p>
+              <a:pPr algn="ctr"/>
+              <a:endParaRPr lang="en-US" dirty="0">
+                <a:ln>
+                  <a:solidFill>
+                    <a:srgbClr val="FFFF00"/>
+                  </a:solidFill>
+                </a:ln>
+              </a:endParaRPr>
+            </a:p>
+          </p:txBody>
+        </p:sp>
+        <p:sp>
+          <p:nvSpPr>
+            <p:cNvPr id="8" name="Rectangle 7">
+              <a:extLst>
+                <a:ext uri="{FF2B5EF4-FFF2-40B4-BE49-F238E27FC236}">
+                  <a16:creationId xmlns:a16="http://schemas.microsoft.com/office/drawing/2014/main" id="{6AE99DF6-373D-194C-8821-B494B5F1356E}"/>
+                </a:ext>
+              </a:extLst>
+            </p:cNvPr>
+            <p:cNvSpPr/>
+            <p:nvPr/>
+          </p:nvSpPr>
+          <p:spPr>
+            <a:xfrm>
+              <a:off x="5993080" y="2096008"/>
+              <a:ext cx="1056904" cy="1142996"/>
+            </a:xfrm>
+            <a:prstGeom prst="rect">
+              <a:avLst/>
+            </a:prstGeom>
             <a:solidFill>
               <a:schemeClr val="tx1"/>
             </a:solidFill>
-          </a:ln>
-        </p:spPr>
-        <p:style>
-          <a:lnRef idx="2">
-            <a:schemeClr val="accent1">
-              <a:shade val="50000"/>
-            </a:schemeClr>
-          </a:lnRef>
-          <a:fillRef idx="1">
-            <a:schemeClr val="accent1"/>
-          </a:fillRef>
-          <a:effectRef idx="0">
-            <a:schemeClr val="accent1"/>
-          </a:effectRef>
-          <a:fontRef idx="minor">
-            <a:schemeClr val="lt1"/>
-          </a:fontRef>
-        </p:style>
-        <p:txBody>
-          <a:bodyPr rtlCol="0" anchor="ctr"/>
-          <a:lstStyle/>
-          <a:p>
-            <a:pPr algn="ctr"/>
-            <a:endParaRPr lang="en-US" dirty="0"/>
-          </a:p>
-        </p:txBody>
-      </p:sp>
-      <p:sp>
-        <p:nvSpPr>
-          <p:cNvPr id="7" name="Rectangle 6">
-            <a:extLst>
-              <a:ext uri="{FF2B5EF4-FFF2-40B4-BE49-F238E27FC236}">
-                <a16:creationId xmlns:a16="http://schemas.microsoft.com/office/drawing/2014/main" id="{3FBCBF7C-1BFE-A344-A88E-9F2152E614BE}"/>
-              </a:ext>
-            </a:extLst>
-          </p:cNvPr>
-          <p:cNvSpPr/>
+            <a:ln>
+              <a:solidFill>
+                <a:schemeClr val="tx1"/>
+              </a:solidFill>
+            </a:ln>
+          </p:spPr>
+          <p:style>
+            <a:lnRef idx="2">
+              <a:schemeClr val="accent1">
+                <a:shade val="50000"/>
+              </a:schemeClr>
+            </a:lnRef>
+            <a:fillRef idx="1">
+              <a:schemeClr val="accent1"/>
+            </a:fillRef>
+            <a:effectRef idx="0">
+              <a:schemeClr val="accent1"/>
+            </a:effectRef>
+            <a:fontRef idx="minor">
+              <a:schemeClr val="lt1"/>
+            </a:fontRef>
+          </p:style>
+          <p:txBody>
+            <a:bodyPr rtlCol="0" anchor="ctr"/>
+            <a:lstStyle/>
+            <a:p>
+              <a:pPr algn="ctr"/>
+              <a:endParaRPr lang="en-US" dirty="0">
+                <a:ln>
+                  <a:solidFill>
+                    <a:srgbClr val="FFFF00"/>
+                  </a:solidFill>
+                </a:ln>
+              </a:endParaRPr>
+            </a:p>
+          </p:txBody>
+        </p:sp>
+      </p:grpSp>
+      <p:grpSp>
+        <p:nvGrpSpPr>
+          <p:cNvPr id="2" name="Group 1">
+            <a:extLst>
+              <a:ext uri="{FF2B5EF4-FFF2-40B4-BE49-F238E27FC236}">
+                <a16:creationId xmlns:a16="http://schemas.microsoft.com/office/drawing/2014/main" id="{20A2F868-403E-E94A-97F7-99CC33FA7D4D}"/>
+              </a:ext>
+            </a:extLst>
+          </p:cNvPr>
+          <p:cNvGrpSpPr/>
           <p:nvPr/>
-        </p:nvSpPr>
-        <p:spPr>
-          <a:xfrm>
-            <a:off x="6060375" y="3239004"/>
-            <a:ext cx="953984" cy="846108"/>
-          </a:xfrm>
-          <a:prstGeom prst="rect">
-            <a:avLst/>
-          </a:prstGeom>
-          <a:solidFill>
-            <a:schemeClr val="tx1"/>
-          </a:solidFill>
-          <a:ln>
-            <a:solidFill>
-              <a:schemeClr val="tx1"/>
-            </a:solidFill>
-          </a:ln>
-        </p:spPr>
-        <p:style>
-          <a:lnRef idx="2">
-            <a:schemeClr val="accent1">
-              <a:shade val="50000"/>
-            </a:schemeClr>
-          </a:lnRef>
-          <a:fillRef idx="1">
-            <a:schemeClr val="accent1"/>
-          </a:fillRef>
-          <a:effectRef idx="0">
-            <a:schemeClr val="accent1"/>
-          </a:effectRef>
-          <a:fontRef idx="minor">
-            <a:schemeClr val="lt1"/>
-          </a:fontRef>
-        </p:style>
-        <p:txBody>
-          <a:bodyPr rtlCol="0" anchor="ctr"/>
-          <a:lstStyle/>
-          <a:p>
-            <a:pPr algn="ctr"/>
-            <a:endParaRPr lang="en-US" dirty="0">
-              <a:ln>
-                <a:solidFill>
-                  <a:srgbClr val="FFFF00"/>
-                </a:solidFill>
-              </a:ln>
-            </a:endParaRPr>
-          </a:p>
-        </p:txBody>
-      </p:sp>
-      <p:sp>
-        <p:nvSpPr>
-          <p:cNvPr id="8" name="Rectangle 7">
-            <a:extLst>
-              <a:ext uri="{FF2B5EF4-FFF2-40B4-BE49-F238E27FC236}">
-                <a16:creationId xmlns:a16="http://schemas.microsoft.com/office/drawing/2014/main" id="{6AE99DF6-373D-194C-8821-B494B5F1356E}"/>
-              </a:ext>
-            </a:extLst>
-          </p:cNvPr>
-          <p:cNvSpPr/>
-          <p:nvPr/>
-        </p:nvSpPr>
-        <p:spPr>
-          <a:xfrm>
-            <a:off x="5993080" y="2096008"/>
-            <a:ext cx="1056904" cy="1142996"/>
-          </a:xfrm>
-          <a:prstGeom prst="rect">
-            <a:avLst/>
-          </a:prstGeom>
-          <a:solidFill>
-            <a:schemeClr val="tx1"/>
-          </a:solidFill>
-          <a:ln>
-            <a:solidFill>
-              <a:schemeClr val="tx1"/>
-            </a:solidFill>
-          </a:ln>
-        </p:spPr>
-        <p:style>
-          <a:lnRef idx="2">
-            <a:schemeClr val="accent1">
-              <a:shade val="50000"/>
-            </a:schemeClr>
-          </a:lnRef>
-          <a:fillRef idx="1">
-            <a:schemeClr val="accent1"/>
-          </a:fillRef>
-          <a:effectRef idx="0">
-            <a:schemeClr val="accent1"/>
-          </a:effectRef>
-          <a:fontRef idx="minor">
-            <a:schemeClr val="lt1"/>
-          </a:fontRef>
-        </p:style>
-        <p:txBody>
-          <a:bodyPr rtlCol="0" anchor="ctr"/>
-          <a:lstStyle/>
-          <a:p>
-            <a:pPr algn="ctr"/>
-            <a:endParaRPr lang="en-US" dirty="0">
-              <a:ln>
-                <a:solidFill>
-                  <a:srgbClr val="FFFF00"/>
-                </a:solidFill>
-              </a:ln>
-            </a:endParaRPr>
-          </a:p>
-        </p:txBody>
-      </p:sp>
-      <p:sp>
-        <p:nvSpPr>
-          <p:cNvPr id="9" name="Rectangle 8">
-            <a:extLst>
-              <a:ext uri="{FF2B5EF4-FFF2-40B4-BE49-F238E27FC236}">
-                <a16:creationId xmlns:a16="http://schemas.microsoft.com/office/drawing/2014/main" id="{314D1501-D898-E04E-B8F2-02E0B53DA8D0}"/>
-              </a:ext>
-            </a:extLst>
-          </p:cNvPr>
-          <p:cNvSpPr/>
-          <p:nvPr/>
-        </p:nvSpPr>
-        <p:spPr>
+        </p:nvGrpSpPr>
+        <p:grpSpPr>
           <a:xfrm>
             <a:off x="7382495" y="2101933"/>
             <a:ext cx="1056904" cy="938150"/>
+            <a:chOff x="7382495" y="2101933"/>
+            <a:chExt cx="1056904" cy="938150"/>
           </a:xfrm>
-          <a:prstGeom prst="rect">
-            <a:avLst/>
-          </a:prstGeom>
-          <a:solidFill>
-            <a:srgbClr val="FFFF00"/>
-          </a:solidFill>
-          <a:ln>
+        </p:grpSpPr>
+        <p:sp>
+          <p:nvSpPr>
+            <p:cNvPr id="9" name="Rectangle 8">
+              <a:extLst>
+                <a:ext uri="{FF2B5EF4-FFF2-40B4-BE49-F238E27FC236}">
+                  <a16:creationId xmlns:a16="http://schemas.microsoft.com/office/drawing/2014/main" id="{314D1501-D898-E04E-B8F2-02E0B53DA8D0}"/>
+                </a:ext>
+              </a:extLst>
+            </p:cNvPr>
+            <p:cNvSpPr/>
+            <p:nvPr/>
+          </p:nvSpPr>
+          <p:spPr>
+            <a:xfrm>
+              <a:off x="7382495" y="2101933"/>
+              <a:ext cx="1056904" cy="938150"/>
+            </a:xfrm>
+            <a:prstGeom prst="rect">
+              <a:avLst/>
+            </a:prstGeom>
             <a:solidFill>
-              <a:schemeClr val="tx1"/>
+              <a:srgbClr val="FFFF00"/>
             </a:solidFill>
-          </a:ln>
-        </p:spPr>
-        <p:style>
-          <a:lnRef idx="2">
-            <a:schemeClr val="accent1">
-              <a:shade val="50000"/>
-            </a:schemeClr>
-          </a:lnRef>
-          <a:fillRef idx="1">
-            <a:schemeClr val="accent1"/>
-          </a:fillRef>
-          <a:effectRef idx="0">
-            <a:schemeClr val="accent1"/>
-          </a:effectRef>
-          <a:fontRef idx="minor">
-            <a:schemeClr val="lt1"/>
-          </a:fontRef>
-        </p:style>
-        <p:txBody>
-          <a:bodyPr rtlCol="0" anchor="ctr"/>
-          <a:lstStyle/>
-          <a:p>
-            <a:pPr algn="ctr"/>
-            <a:endParaRPr lang="en-US" dirty="0"/>
-          </a:p>
-        </p:txBody>
-      </p:sp>
-      <p:sp>
-        <p:nvSpPr>
-          <p:cNvPr id="10" name="TextBox 9">
-            <a:extLst>
-              <a:ext uri="{FF2B5EF4-FFF2-40B4-BE49-F238E27FC236}">
-                <a16:creationId xmlns:a16="http://schemas.microsoft.com/office/drawing/2014/main" id="{C7E57A8A-941E-D547-B643-FDD1A418F643}"/>
-              </a:ext>
-            </a:extLst>
-          </p:cNvPr>
-          <p:cNvSpPr txBox="1"/>
-          <p:nvPr/>
-        </p:nvSpPr>
-        <p:spPr>
-          <a:xfrm>
-            <a:off x="7536874" y="2340175"/>
-            <a:ext cx="748145" cy="461665"/>
-          </a:xfrm>
-          <a:prstGeom prst="rect">
-            <a:avLst/>
-          </a:prstGeom>
-          <a:noFill/>
-        </p:spPr>
-        <p:txBody>
-          <a:bodyPr wrap="square" rtlCol="0">
-            <a:spAutoFit/>
-          </a:bodyPr>
-          <a:lstStyle/>
-          <a:p>
-            <a:pPr algn="ctr"/>
-            <a:r>
-              <a:rPr lang="en-US" sz="2400" dirty="0"/>
-              <a:t>END</a:t>
-            </a:r>
-          </a:p>
-        </p:txBody>
-      </p:sp>
+            <a:ln>
+              <a:solidFill>
+                <a:schemeClr val="tx1"/>
+              </a:solidFill>
+            </a:ln>
+          </p:spPr>
+          <p:style>
+            <a:lnRef idx="2">
+              <a:schemeClr val="accent1">
+                <a:shade val="50000"/>
+              </a:schemeClr>
+            </a:lnRef>
+            <a:fillRef idx="1">
+              <a:schemeClr val="accent1"/>
+            </a:fillRef>
+            <a:effectRef idx="0">
+              <a:schemeClr val="accent1"/>
+            </a:effectRef>
+            <a:fontRef idx="minor">
+              <a:schemeClr val="lt1"/>
+            </a:fontRef>
+          </p:style>
+          <p:txBody>
+            <a:bodyPr rtlCol="0" anchor="ctr"/>
+            <a:lstStyle/>
+            <a:p>
+              <a:pPr algn="ctr"/>
+              <a:endParaRPr lang="en-US" dirty="0"/>
+            </a:p>
+          </p:txBody>
+        </p:sp>
+        <p:sp>
+          <p:nvSpPr>
+            <p:cNvPr id="10" name="TextBox 9">
+              <a:extLst>
+                <a:ext uri="{FF2B5EF4-FFF2-40B4-BE49-F238E27FC236}">
+                  <a16:creationId xmlns:a16="http://schemas.microsoft.com/office/drawing/2014/main" id="{C7E57A8A-941E-D547-B643-FDD1A418F643}"/>
+                </a:ext>
+              </a:extLst>
+            </p:cNvPr>
+            <p:cNvSpPr txBox="1"/>
+            <p:nvPr/>
+          </p:nvSpPr>
+          <p:spPr>
+            <a:xfrm>
+              <a:off x="7536874" y="2340175"/>
+              <a:ext cx="748145" cy="461665"/>
+            </a:xfrm>
+            <a:prstGeom prst="rect">
+              <a:avLst/>
+            </a:prstGeom>
+            <a:noFill/>
+          </p:spPr>
+          <p:txBody>
+            <a:bodyPr wrap="square" rtlCol="0">
+              <a:spAutoFit/>
+            </a:bodyPr>
+            <a:lstStyle/>
+            <a:p>
+              <a:pPr algn="ctr"/>
+              <a:r>
+                <a:rPr lang="en-US" sz="2400" dirty="0"/>
+                <a:t>END</a:t>
+              </a:r>
+            </a:p>
+          </p:txBody>
+        </p:sp>
+      </p:grpSp>
     </p:spTree>
     <p:extLst>
       <p:ext uri="{BB962C8B-B14F-4D97-AF65-F5344CB8AC3E}">
         <p14:creationId xmlns:p14="http://schemas.microsoft.com/office/powerpoint/2010/main" val="2407424060"/>
+      </p:ext>
+    </p:extLst>
+  </p:cSld>
+  <p:clrMapOvr>
+    <a:masterClrMapping/>
+  </p:clrMapOvr>
+</p:sld>
+</file>
+
+<file path=ppt/slides/slide2.xml><?xml version="1.0" encoding="utf-8"?>
+<p:sld xmlns:a="http://schemas.openxmlformats.org/drawingml/2006/main" xmlns:r="http://schemas.openxmlformats.org/officeDocument/2006/relationships" xmlns:p="http://schemas.openxmlformats.org/presentationml/2006/main">
+  <p:cSld>
+    <p:spTree>
+      <p:nvGrpSpPr>
+        <p:cNvPr id="1" name=""/>
+        <p:cNvGrpSpPr/>
+        <p:nvPr/>
+      </p:nvGrpSpPr>
+      <p:grpSpPr>
+        <a:xfrm>
+          <a:off x="0" y="0"/>
+          <a:ext cx="0" cy="0"/>
+          <a:chOff x="0" y="0"/>
+          <a:chExt cx="0" cy="0"/>
+        </a:xfrm>
+      </p:grpSpPr>
+      <p:graphicFrame>
+        <p:nvGraphicFramePr>
+          <p:cNvPr id="4" name="Table 3">
+            <a:extLst>
+              <a:ext uri="{FF2B5EF4-FFF2-40B4-BE49-F238E27FC236}">
+                <a16:creationId xmlns:a16="http://schemas.microsoft.com/office/drawing/2014/main" id="{41C1F142-14A9-B54C-B756-970C9CCC9F52}"/>
+              </a:ext>
+            </a:extLst>
+          </p:cNvPr>
+          <p:cNvGraphicFramePr>
+            <a:graphicFrameLocks noGrp="1"/>
+          </p:cNvGraphicFramePr>
+          <p:nvPr>
+            <p:extLst>
+              <p:ext uri="{D42A27DB-BD31-4B8C-83A1-F6EECF244321}">
+                <p14:modId xmlns:p14="http://schemas.microsoft.com/office/powerpoint/2010/main" val="3772150811"/>
+              </p:ext>
+            </p:extLst>
+          </p:nvPr>
+        </p:nvGraphicFramePr>
+        <p:xfrm>
+          <a:off x="2962232" y="1553908"/>
+          <a:ext cx="5510152" cy="5035139"/>
+        </p:xfrm>
+        <a:graphic>
+          <a:graphicData uri="http://schemas.openxmlformats.org/drawingml/2006/table">
+            <a:tbl>
+              <a:tblPr firstRow="1" bandRow="1">
+                <a:tableStyleId>{5C22544A-7EE6-4342-B048-85BDC9FD1C3A}</a:tableStyleId>
+              </a:tblPr>
+              <a:tblGrid>
+                <a:gridCol w="1377538">
+                  <a:extLst>
+                    <a:ext uri="{9D8B030D-6E8A-4147-A177-3AD203B41FA5}">
+                      <a16:colId xmlns:a16="http://schemas.microsoft.com/office/drawing/2014/main" val="2285803807"/>
+                    </a:ext>
+                  </a:extLst>
+                </a:gridCol>
+                <a:gridCol w="1377538">
+                  <a:extLst>
+                    <a:ext uri="{9D8B030D-6E8A-4147-A177-3AD203B41FA5}">
+                      <a16:colId xmlns:a16="http://schemas.microsoft.com/office/drawing/2014/main" val="2071978043"/>
+                    </a:ext>
+                  </a:extLst>
+                </a:gridCol>
+                <a:gridCol w="1377538">
+                  <a:extLst>
+                    <a:ext uri="{9D8B030D-6E8A-4147-A177-3AD203B41FA5}">
+                      <a16:colId xmlns:a16="http://schemas.microsoft.com/office/drawing/2014/main" val="11133922"/>
+                    </a:ext>
+                  </a:extLst>
+                </a:gridCol>
+                <a:gridCol w="1377538">
+                  <a:extLst>
+                    <a:ext uri="{9D8B030D-6E8A-4147-A177-3AD203B41FA5}">
+                      <a16:colId xmlns:a16="http://schemas.microsoft.com/office/drawing/2014/main" val="653842934"/>
+                    </a:ext>
+                  </a:extLst>
+                </a:gridCol>
+              </a:tblGrid>
+              <a:tr h="1519487">
+                <a:tc>
+                  <a:txBody>
+                    <a:bodyPr/>
+                    <a:lstStyle/>
+                    <a:p>
+                      <a:endParaRPr lang="en-US" dirty="0"/>
+                    </a:p>
+                  </a:txBody>
+                  <a:tcPr>
+                    <a:lnL w="12700" cap="flat" cmpd="sng" algn="ctr">
+                      <a:solidFill>
+                        <a:schemeClr val="tx1"/>
+                      </a:solidFill>
+                      <a:prstDash val="solid"/>
+                      <a:round/>
+                      <a:headEnd type="none" w="med" len="med"/>
+                      <a:tailEnd type="none" w="med" len="med"/>
+                    </a:lnL>
+                    <a:lnR w="12700" cap="flat" cmpd="sng" algn="ctr">
+                      <a:solidFill>
+                        <a:schemeClr val="tx1"/>
+                      </a:solidFill>
+                      <a:prstDash val="solid"/>
+                      <a:round/>
+                      <a:headEnd type="none" w="med" len="med"/>
+                      <a:tailEnd type="none" w="med" len="med"/>
+                    </a:lnR>
+                    <a:lnT w="12700" cap="flat" cmpd="sng" algn="ctr">
+                      <a:solidFill>
+                        <a:schemeClr val="tx1"/>
+                      </a:solidFill>
+                      <a:prstDash val="solid"/>
+                      <a:round/>
+                      <a:headEnd type="none" w="med" len="med"/>
+                      <a:tailEnd type="none" w="med" len="med"/>
+                    </a:lnT>
+                    <a:lnB w="12700" cap="flat" cmpd="sng" algn="ctr">
+                      <a:solidFill>
+                        <a:schemeClr val="tx1"/>
+                      </a:solidFill>
+                      <a:prstDash val="solid"/>
+                      <a:round/>
+                      <a:headEnd type="none" w="med" len="med"/>
+                      <a:tailEnd type="none" w="med" len="med"/>
+                    </a:lnB>
+                    <a:noFill/>
+                  </a:tcPr>
+                </a:tc>
+                <a:tc>
+                  <a:txBody>
+                    <a:bodyPr/>
+                    <a:lstStyle/>
+                    <a:p>
+                      <a:endParaRPr lang="en-US" dirty="0"/>
+                    </a:p>
+                  </a:txBody>
+                  <a:tcPr>
+                    <a:lnL w="12700" cap="flat" cmpd="sng" algn="ctr">
+                      <a:solidFill>
+                        <a:schemeClr val="tx1"/>
+                      </a:solidFill>
+                      <a:prstDash val="solid"/>
+                      <a:round/>
+                      <a:headEnd type="none" w="med" len="med"/>
+                      <a:tailEnd type="none" w="med" len="med"/>
+                    </a:lnL>
+                    <a:lnR w="12700" cap="flat" cmpd="sng" algn="ctr">
+                      <a:solidFill>
+                        <a:schemeClr val="tx1"/>
+                      </a:solidFill>
+                      <a:prstDash val="solid"/>
+                      <a:round/>
+                      <a:headEnd type="none" w="med" len="med"/>
+                      <a:tailEnd type="none" w="med" len="med"/>
+                    </a:lnR>
+                    <a:lnT w="12700" cap="flat" cmpd="sng" algn="ctr">
+                      <a:solidFill>
+                        <a:schemeClr val="tx1"/>
+                      </a:solidFill>
+                      <a:prstDash val="solid"/>
+                      <a:round/>
+                      <a:headEnd type="none" w="med" len="med"/>
+                      <a:tailEnd type="none" w="med" len="med"/>
+                    </a:lnT>
+                    <a:lnB w="12700" cap="flat" cmpd="sng" algn="ctr">
+                      <a:solidFill>
+                        <a:schemeClr val="tx1"/>
+                      </a:solidFill>
+                      <a:prstDash val="solid"/>
+                      <a:round/>
+                      <a:headEnd type="none" w="med" len="med"/>
+                      <a:tailEnd type="none" w="med" len="med"/>
+                    </a:lnB>
+                    <a:noFill/>
+                  </a:tcPr>
+                </a:tc>
+                <a:tc>
+                  <a:txBody>
+                    <a:bodyPr/>
+                    <a:lstStyle/>
+                    <a:p>
+                      <a:endParaRPr lang="en-US"/>
+                    </a:p>
+                  </a:txBody>
+                  <a:tcPr>
+                    <a:lnL w="12700" cap="flat" cmpd="sng" algn="ctr">
+                      <a:solidFill>
+                        <a:schemeClr val="tx1"/>
+                      </a:solidFill>
+                      <a:prstDash val="solid"/>
+                      <a:round/>
+                      <a:headEnd type="none" w="med" len="med"/>
+                      <a:tailEnd type="none" w="med" len="med"/>
+                    </a:lnL>
+                    <a:lnR w="12700" cap="flat" cmpd="sng" algn="ctr">
+                      <a:solidFill>
+                        <a:schemeClr val="tx1"/>
+                      </a:solidFill>
+                      <a:prstDash val="solid"/>
+                      <a:round/>
+                      <a:headEnd type="none" w="med" len="med"/>
+                      <a:tailEnd type="none" w="med" len="med"/>
+                    </a:lnR>
+                    <a:lnT w="12700" cap="flat" cmpd="sng" algn="ctr">
+                      <a:solidFill>
+                        <a:schemeClr val="tx1"/>
+                      </a:solidFill>
+                      <a:prstDash val="solid"/>
+                      <a:round/>
+                      <a:headEnd type="none" w="med" len="med"/>
+                      <a:tailEnd type="none" w="med" len="med"/>
+                    </a:lnT>
+                    <a:lnB w="12700" cap="flat" cmpd="sng" algn="ctr">
+                      <a:solidFill>
+                        <a:schemeClr val="tx1"/>
+                      </a:solidFill>
+                      <a:prstDash val="solid"/>
+                      <a:round/>
+                      <a:headEnd type="none" w="med" len="med"/>
+                      <a:tailEnd type="none" w="med" len="med"/>
+                    </a:lnB>
+                    <a:noFill/>
+                  </a:tcPr>
+                </a:tc>
+                <a:tc>
+                  <a:txBody>
+                    <a:bodyPr/>
+                    <a:lstStyle/>
+                    <a:p>
+                      <a:endParaRPr lang="en-US"/>
+                    </a:p>
+                  </a:txBody>
+                  <a:tcPr>
+                    <a:lnL w="12700" cap="flat" cmpd="sng" algn="ctr">
+                      <a:solidFill>
+                        <a:schemeClr val="tx1"/>
+                      </a:solidFill>
+                      <a:prstDash val="solid"/>
+                      <a:round/>
+                      <a:headEnd type="none" w="med" len="med"/>
+                      <a:tailEnd type="none" w="med" len="med"/>
+                    </a:lnL>
+                    <a:lnR w="12700" cap="flat" cmpd="sng" algn="ctr">
+                      <a:solidFill>
+                        <a:schemeClr val="tx1"/>
+                      </a:solidFill>
+                      <a:prstDash val="solid"/>
+                      <a:round/>
+                      <a:headEnd type="none" w="med" len="med"/>
+                      <a:tailEnd type="none" w="med" len="med"/>
+                    </a:lnR>
+                    <a:lnT w="12700" cap="flat" cmpd="sng" algn="ctr">
+                      <a:solidFill>
+                        <a:schemeClr val="tx1"/>
+                      </a:solidFill>
+                      <a:prstDash val="solid"/>
+                      <a:round/>
+                      <a:headEnd type="none" w="med" len="med"/>
+                      <a:tailEnd type="none" w="med" len="med"/>
+                    </a:lnT>
+                    <a:lnB w="12700" cap="flat" cmpd="sng" algn="ctr">
+                      <a:solidFill>
+                        <a:schemeClr val="tx1"/>
+                      </a:solidFill>
+                      <a:prstDash val="solid"/>
+                      <a:round/>
+                      <a:headEnd type="none" w="med" len="med"/>
+                      <a:tailEnd type="none" w="med" len="med"/>
+                    </a:lnB>
+                    <a:noFill/>
+                  </a:tcPr>
+                </a:tc>
+                <a:extLst>
+                  <a:ext uri="{0D108BD9-81ED-4DB2-BD59-A6C34878D82A}">
+                    <a16:rowId xmlns:a16="http://schemas.microsoft.com/office/drawing/2014/main" val="3200464199"/>
+                  </a:ext>
+                </a:extLst>
+              </a:tr>
+              <a:tr h="1171884">
+                <a:tc>
+                  <a:txBody>
+                    <a:bodyPr/>
+                    <a:lstStyle/>
+                    <a:p>
+                      <a:endParaRPr lang="en-US"/>
+                    </a:p>
+                  </a:txBody>
+                  <a:tcPr>
+                    <a:lnL w="12700" cap="flat" cmpd="sng" algn="ctr">
+                      <a:solidFill>
+                        <a:schemeClr val="tx1"/>
+                      </a:solidFill>
+                      <a:prstDash val="solid"/>
+                      <a:round/>
+                      <a:headEnd type="none" w="med" len="med"/>
+                      <a:tailEnd type="none" w="med" len="med"/>
+                    </a:lnL>
+                    <a:lnR w="12700" cap="flat" cmpd="sng" algn="ctr">
+                      <a:solidFill>
+                        <a:schemeClr val="tx1"/>
+                      </a:solidFill>
+                      <a:prstDash val="solid"/>
+                      <a:round/>
+                      <a:headEnd type="none" w="med" len="med"/>
+                      <a:tailEnd type="none" w="med" len="med"/>
+                    </a:lnR>
+                    <a:lnT w="12700" cap="flat" cmpd="sng" algn="ctr">
+                      <a:solidFill>
+                        <a:schemeClr val="tx1"/>
+                      </a:solidFill>
+                      <a:prstDash val="solid"/>
+                      <a:round/>
+                      <a:headEnd type="none" w="med" len="med"/>
+                      <a:tailEnd type="none" w="med" len="med"/>
+                    </a:lnT>
+                    <a:lnB w="12700" cap="flat" cmpd="sng" algn="ctr">
+                      <a:solidFill>
+                        <a:schemeClr val="tx1"/>
+                      </a:solidFill>
+                      <a:prstDash val="solid"/>
+                      <a:round/>
+                      <a:headEnd type="none" w="med" len="med"/>
+                      <a:tailEnd type="none" w="med" len="med"/>
+                    </a:lnB>
+                    <a:noFill/>
+                  </a:tcPr>
+                </a:tc>
+                <a:tc>
+                  <a:txBody>
+                    <a:bodyPr/>
+                    <a:lstStyle/>
+                    <a:p>
+                      <a:endParaRPr lang="en-US"/>
+                    </a:p>
+                  </a:txBody>
+                  <a:tcPr>
+                    <a:lnL w="12700" cap="flat" cmpd="sng" algn="ctr">
+                      <a:solidFill>
+                        <a:schemeClr val="tx1"/>
+                      </a:solidFill>
+                      <a:prstDash val="solid"/>
+                      <a:round/>
+                      <a:headEnd type="none" w="med" len="med"/>
+                      <a:tailEnd type="none" w="med" len="med"/>
+                    </a:lnL>
+                    <a:lnR w="12700" cap="flat" cmpd="sng" algn="ctr">
+                      <a:solidFill>
+                        <a:schemeClr val="tx1"/>
+                      </a:solidFill>
+                      <a:prstDash val="solid"/>
+                      <a:round/>
+                      <a:headEnd type="none" w="med" len="med"/>
+                      <a:tailEnd type="none" w="med" len="med"/>
+                    </a:lnR>
+                    <a:lnT w="12700" cap="flat" cmpd="sng" algn="ctr">
+                      <a:solidFill>
+                        <a:schemeClr val="tx1"/>
+                      </a:solidFill>
+                      <a:prstDash val="solid"/>
+                      <a:round/>
+                      <a:headEnd type="none" w="med" len="med"/>
+                      <a:tailEnd type="none" w="med" len="med"/>
+                    </a:lnT>
+                    <a:lnB w="12700" cap="flat" cmpd="sng" algn="ctr">
+                      <a:solidFill>
+                        <a:schemeClr val="tx1"/>
+                      </a:solidFill>
+                      <a:prstDash val="solid"/>
+                      <a:round/>
+                      <a:headEnd type="none" w="med" len="med"/>
+                      <a:tailEnd type="none" w="med" len="med"/>
+                    </a:lnB>
+                    <a:noFill/>
+                  </a:tcPr>
+                </a:tc>
+                <a:tc>
+                  <a:txBody>
+                    <a:bodyPr/>
+                    <a:lstStyle/>
+                    <a:p>
+                      <a:endParaRPr lang="en-US"/>
+                    </a:p>
+                  </a:txBody>
+                  <a:tcPr>
+                    <a:lnL w="12700" cap="flat" cmpd="sng" algn="ctr">
+                      <a:solidFill>
+                        <a:schemeClr val="tx1"/>
+                      </a:solidFill>
+                      <a:prstDash val="solid"/>
+                      <a:round/>
+                      <a:headEnd type="none" w="med" len="med"/>
+                      <a:tailEnd type="none" w="med" len="med"/>
+                    </a:lnL>
+                    <a:lnR w="12700" cap="flat" cmpd="sng" algn="ctr">
+                      <a:solidFill>
+                        <a:schemeClr val="tx1"/>
+                      </a:solidFill>
+                      <a:prstDash val="solid"/>
+                      <a:round/>
+                      <a:headEnd type="none" w="med" len="med"/>
+                      <a:tailEnd type="none" w="med" len="med"/>
+                    </a:lnR>
+                    <a:lnT w="12700" cap="flat" cmpd="sng" algn="ctr">
+                      <a:solidFill>
+                        <a:schemeClr val="tx1"/>
+                      </a:solidFill>
+                      <a:prstDash val="solid"/>
+                      <a:round/>
+                      <a:headEnd type="none" w="med" len="med"/>
+                      <a:tailEnd type="none" w="med" len="med"/>
+                    </a:lnT>
+                    <a:lnB w="12700" cap="flat" cmpd="sng" algn="ctr">
+                      <a:solidFill>
+                        <a:schemeClr val="tx1"/>
+                      </a:solidFill>
+                      <a:prstDash val="solid"/>
+                      <a:round/>
+                      <a:headEnd type="none" w="med" len="med"/>
+                      <a:tailEnd type="none" w="med" len="med"/>
+                    </a:lnB>
+                    <a:noFill/>
+                  </a:tcPr>
+                </a:tc>
+                <a:tc>
+                  <a:txBody>
+                    <a:bodyPr/>
+                    <a:lstStyle/>
+                    <a:p>
+                      <a:endParaRPr lang="en-US" dirty="0"/>
+                    </a:p>
+                  </a:txBody>
+                  <a:tcPr>
+                    <a:lnL w="12700" cap="flat" cmpd="sng" algn="ctr">
+                      <a:solidFill>
+                        <a:schemeClr val="tx1"/>
+                      </a:solidFill>
+                      <a:prstDash val="solid"/>
+                      <a:round/>
+                      <a:headEnd type="none" w="med" len="med"/>
+                      <a:tailEnd type="none" w="med" len="med"/>
+                    </a:lnL>
+                    <a:lnR w="12700" cap="flat" cmpd="sng" algn="ctr">
+                      <a:solidFill>
+                        <a:schemeClr val="tx1"/>
+                      </a:solidFill>
+                      <a:prstDash val="solid"/>
+                      <a:round/>
+                      <a:headEnd type="none" w="med" len="med"/>
+                      <a:tailEnd type="none" w="med" len="med"/>
+                    </a:lnR>
+                    <a:lnT w="12700" cap="flat" cmpd="sng" algn="ctr">
+                      <a:solidFill>
+                        <a:schemeClr val="tx1"/>
+                      </a:solidFill>
+                      <a:prstDash val="solid"/>
+                      <a:round/>
+                      <a:headEnd type="none" w="med" len="med"/>
+                      <a:tailEnd type="none" w="med" len="med"/>
+                    </a:lnT>
+                    <a:lnB w="12700" cap="flat" cmpd="sng" algn="ctr">
+                      <a:solidFill>
+                        <a:schemeClr val="tx1"/>
+                      </a:solidFill>
+                      <a:prstDash val="solid"/>
+                      <a:round/>
+                      <a:headEnd type="none" w="med" len="med"/>
+                      <a:tailEnd type="none" w="med" len="med"/>
+                    </a:lnB>
+                    <a:noFill/>
+                  </a:tcPr>
+                </a:tc>
+                <a:extLst>
+                  <a:ext uri="{0D108BD9-81ED-4DB2-BD59-A6C34878D82A}">
+                    <a16:rowId xmlns:a16="http://schemas.microsoft.com/office/drawing/2014/main" val="4040494564"/>
+                  </a:ext>
+                </a:extLst>
+              </a:tr>
+              <a:tr h="1171884">
+                <a:tc>
+                  <a:txBody>
+                    <a:bodyPr/>
+                    <a:lstStyle/>
+                    <a:p>
+                      <a:endParaRPr lang="en-US"/>
+                    </a:p>
+                  </a:txBody>
+                  <a:tcPr>
+                    <a:lnL w="12700" cap="flat" cmpd="sng" algn="ctr">
+                      <a:solidFill>
+                        <a:schemeClr val="tx1"/>
+                      </a:solidFill>
+                      <a:prstDash val="solid"/>
+                      <a:round/>
+                      <a:headEnd type="none" w="med" len="med"/>
+                      <a:tailEnd type="none" w="med" len="med"/>
+                    </a:lnL>
+                    <a:lnR w="12700" cap="flat" cmpd="sng" algn="ctr">
+                      <a:solidFill>
+                        <a:schemeClr val="tx1"/>
+                      </a:solidFill>
+                      <a:prstDash val="solid"/>
+                      <a:round/>
+                      <a:headEnd type="none" w="med" len="med"/>
+                      <a:tailEnd type="none" w="med" len="med"/>
+                    </a:lnR>
+                    <a:lnT w="12700" cap="flat" cmpd="sng" algn="ctr">
+                      <a:solidFill>
+                        <a:schemeClr val="tx1"/>
+                      </a:solidFill>
+                      <a:prstDash val="solid"/>
+                      <a:round/>
+                      <a:headEnd type="none" w="med" len="med"/>
+                      <a:tailEnd type="none" w="med" len="med"/>
+                    </a:lnT>
+                    <a:lnB w="12700" cap="flat" cmpd="sng" algn="ctr">
+                      <a:solidFill>
+                        <a:schemeClr val="tx1"/>
+                      </a:solidFill>
+                      <a:prstDash val="solid"/>
+                      <a:round/>
+                      <a:headEnd type="none" w="med" len="med"/>
+                      <a:tailEnd type="none" w="med" len="med"/>
+                    </a:lnB>
+                    <a:noFill/>
+                  </a:tcPr>
+                </a:tc>
+                <a:tc>
+                  <a:txBody>
+                    <a:bodyPr/>
+                    <a:lstStyle/>
+                    <a:p>
+                      <a:endParaRPr lang="en-US" dirty="0"/>
+                    </a:p>
+                  </a:txBody>
+                  <a:tcPr>
+                    <a:lnL w="12700" cap="flat" cmpd="sng" algn="ctr">
+                      <a:solidFill>
+                        <a:schemeClr val="tx1"/>
+                      </a:solidFill>
+                      <a:prstDash val="solid"/>
+                      <a:round/>
+                      <a:headEnd type="none" w="med" len="med"/>
+                      <a:tailEnd type="none" w="med" len="med"/>
+                    </a:lnL>
+                    <a:lnR w="12700" cap="flat" cmpd="sng" algn="ctr">
+                      <a:solidFill>
+                        <a:schemeClr val="tx1"/>
+                      </a:solidFill>
+                      <a:prstDash val="solid"/>
+                      <a:round/>
+                      <a:headEnd type="none" w="med" len="med"/>
+                      <a:tailEnd type="none" w="med" len="med"/>
+                    </a:lnR>
+                    <a:lnT w="12700" cap="flat" cmpd="sng" algn="ctr">
+                      <a:solidFill>
+                        <a:schemeClr val="tx1"/>
+                      </a:solidFill>
+                      <a:prstDash val="solid"/>
+                      <a:round/>
+                      <a:headEnd type="none" w="med" len="med"/>
+                      <a:tailEnd type="none" w="med" len="med"/>
+                    </a:lnT>
+                    <a:lnB w="12700" cap="flat" cmpd="sng" algn="ctr">
+                      <a:solidFill>
+                        <a:schemeClr val="tx1"/>
+                      </a:solidFill>
+                      <a:prstDash val="solid"/>
+                      <a:round/>
+                      <a:headEnd type="none" w="med" len="med"/>
+                      <a:tailEnd type="none" w="med" len="med"/>
+                    </a:lnB>
+                    <a:noFill/>
+                  </a:tcPr>
+                </a:tc>
+                <a:tc>
+                  <a:txBody>
+                    <a:bodyPr/>
+                    <a:lstStyle/>
+                    <a:p>
+                      <a:endParaRPr lang="en-US" dirty="0"/>
+                    </a:p>
+                  </a:txBody>
+                  <a:tcPr>
+                    <a:lnL w="12700" cap="flat" cmpd="sng" algn="ctr">
+                      <a:solidFill>
+                        <a:schemeClr val="tx1"/>
+                      </a:solidFill>
+                      <a:prstDash val="solid"/>
+                      <a:round/>
+                      <a:headEnd type="none" w="med" len="med"/>
+                      <a:tailEnd type="none" w="med" len="med"/>
+                    </a:lnL>
+                    <a:lnR w="12700" cap="flat" cmpd="sng" algn="ctr">
+                      <a:solidFill>
+                        <a:schemeClr val="tx1"/>
+                      </a:solidFill>
+                      <a:prstDash val="solid"/>
+                      <a:round/>
+                      <a:headEnd type="none" w="med" len="med"/>
+                      <a:tailEnd type="none" w="med" len="med"/>
+                    </a:lnR>
+                    <a:lnT w="12700" cap="flat" cmpd="sng" algn="ctr">
+                      <a:solidFill>
+                        <a:schemeClr val="tx1"/>
+                      </a:solidFill>
+                      <a:prstDash val="solid"/>
+                      <a:round/>
+                      <a:headEnd type="none" w="med" len="med"/>
+                      <a:tailEnd type="none" w="med" len="med"/>
+                    </a:lnT>
+                    <a:lnB w="12700" cap="flat" cmpd="sng" algn="ctr">
+                      <a:solidFill>
+                        <a:schemeClr val="tx1"/>
+                      </a:solidFill>
+                      <a:prstDash val="solid"/>
+                      <a:round/>
+                      <a:headEnd type="none" w="med" len="med"/>
+                      <a:tailEnd type="none" w="med" len="med"/>
+                    </a:lnB>
+                    <a:noFill/>
+                  </a:tcPr>
+                </a:tc>
+                <a:tc>
+                  <a:txBody>
+                    <a:bodyPr/>
+                    <a:lstStyle/>
+                    <a:p>
+                      <a:endParaRPr lang="en-US" dirty="0"/>
+                    </a:p>
+                  </a:txBody>
+                  <a:tcPr>
+                    <a:lnL w="12700" cap="flat" cmpd="sng" algn="ctr">
+                      <a:solidFill>
+                        <a:schemeClr val="tx1"/>
+                      </a:solidFill>
+                      <a:prstDash val="solid"/>
+                      <a:round/>
+                      <a:headEnd type="none" w="med" len="med"/>
+                      <a:tailEnd type="none" w="med" len="med"/>
+                    </a:lnL>
+                    <a:lnR w="12700" cap="flat" cmpd="sng" algn="ctr">
+                      <a:solidFill>
+                        <a:schemeClr val="tx1"/>
+                      </a:solidFill>
+                      <a:prstDash val="solid"/>
+                      <a:round/>
+                      <a:headEnd type="none" w="med" len="med"/>
+                      <a:tailEnd type="none" w="med" len="med"/>
+                    </a:lnR>
+                    <a:lnT w="12700" cap="flat" cmpd="sng" algn="ctr">
+                      <a:solidFill>
+                        <a:schemeClr val="tx1"/>
+                      </a:solidFill>
+                      <a:prstDash val="solid"/>
+                      <a:round/>
+                      <a:headEnd type="none" w="med" len="med"/>
+                      <a:tailEnd type="none" w="med" len="med"/>
+                    </a:lnT>
+                    <a:lnB w="12700" cap="flat" cmpd="sng" algn="ctr">
+                      <a:solidFill>
+                        <a:schemeClr val="tx1"/>
+                      </a:solidFill>
+                      <a:prstDash val="solid"/>
+                      <a:round/>
+                      <a:headEnd type="none" w="med" len="med"/>
+                      <a:tailEnd type="none" w="med" len="med"/>
+                    </a:lnB>
+                    <a:noFill/>
+                  </a:tcPr>
+                </a:tc>
+                <a:extLst>
+                  <a:ext uri="{0D108BD9-81ED-4DB2-BD59-A6C34878D82A}">
+                    <a16:rowId xmlns:a16="http://schemas.microsoft.com/office/drawing/2014/main" val="3490139598"/>
+                  </a:ext>
+                </a:extLst>
+              </a:tr>
+              <a:tr h="1171884">
+                <a:tc>
+                  <a:txBody>
+                    <a:bodyPr/>
+                    <a:lstStyle/>
+                    <a:p>
+                      <a:endParaRPr lang="en-US"/>
+                    </a:p>
+                  </a:txBody>
+                  <a:tcPr>
+                    <a:lnL w="12700" cap="flat" cmpd="sng" algn="ctr">
+                      <a:solidFill>
+                        <a:schemeClr val="tx1"/>
+                      </a:solidFill>
+                      <a:prstDash val="solid"/>
+                      <a:round/>
+                      <a:headEnd type="none" w="med" len="med"/>
+                      <a:tailEnd type="none" w="med" len="med"/>
+                    </a:lnL>
+                    <a:lnR w="12700" cap="flat" cmpd="sng" algn="ctr">
+                      <a:solidFill>
+                        <a:schemeClr val="tx1"/>
+                      </a:solidFill>
+                      <a:prstDash val="solid"/>
+                      <a:round/>
+                      <a:headEnd type="none" w="med" len="med"/>
+                      <a:tailEnd type="none" w="med" len="med"/>
+                    </a:lnR>
+                    <a:lnT w="12700" cap="flat" cmpd="sng" algn="ctr">
+                      <a:solidFill>
+                        <a:schemeClr val="tx1"/>
+                      </a:solidFill>
+                      <a:prstDash val="solid"/>
+                      <a:round/>
+                      <a:headEnd type="none" w="med" len="med"/>
+                      <a:tailEnd type="none" w="med" len="med"/>
+                    </a:lnT>
+                    <a:lnB w="12700" cap="flat" cmpd="sng" algn="ctr">
+                      <a:solidFill>
+                        <a:schemeClr val="tx1"/>
+                      </a:solidFill>
+                      <a:prstDash val="solid"/>
+                      <a:round/>
+                      <a:headEnd type="none" w="med" len="med"/>
+                      <a:tailEnd type="none" w="med" len="med"/>
+                    </a:lnB>
+                    <a:noFill/>
+                  </a:tcPr>
+                </a:tc>
+                <a:tc>
+                  <a:txBody>
+                    <a:bodyPr/>
+                    <a:lstStyle/>
+                    <a:p>
+                      <a:endParaRPr lang="en-US" dirty="0"/>
+                    </a:p>
+                  </a:txBody>
+                  <a:tcPr>
+                    <a:lnL w="12700" cap="flat" cmpd="sng" algn="ctr">
+                      <a:solidFill>
+                        <a:schemeClr val="tx1"/>
+                      </a:solidFill>
+                      <a:prstDash val="solid"/>
+                      <a:round/>
+                      <a:headEnd type="none" w="med" len="med"/>
+                      <a:tailEnd type="none" w="med" len="med"/>
+                    </a:lnL>
+                    <a:lnR w="12700" cap="flat" cmpd="sng" algn="ctr">
+                      <a:solidFill>
+                        <a:schemeClr val="tx1"/>
+                      </a:solidFill>
+                      <a:prstDash val="solid"/>
+                      <a:round/>
+                      <a:headEnd type="none" w="med" len="med"/>
+                      <a:tailEnd type="none" w="med" len="med"/>
+                    </a:lnR>
+                    <a:lnT w="12700" cap="flat" cmpd="sng" algn="ctr">
+                      <a:solidFill>
+                        <a:schemeClr val="tx1"/>
+                      </a:solidFill>
+                      <a:prstDash val="solid"/>
+                      <a:round/>
+                      <a:headEnd type="none" w="med" len="med"/>
+                      <a:tailEnd type="none" w="med" len="med"/>
+                    </a:lnT>
+                    <a:lnB w="12700" cap="flat" cmpd="sng" algn="ctr">
+                      <a:solidFill>
+                        <a:schemeClr val="tx1"/>
+                      </a:solidFill>
+                      <a:prstDash val="solid"/>
+                      <a:round/>
+                      <a:headEnd type="none" w="med" len="med"/>
+                      <a:tailEnd type="none" w="med" len="med"/>
+                    </a:lnB>
+                    <a:noFill/>
+                  </a:tcPr>
+                </a:tc>
+                <a:tc>
+                  <a:txBody>
+                    <a:bodyPr/>
+                    <a:lstStyle/>
+                    <a:p>
+                      <a:endParaRPr lang="en-US" dirty="0"/>
+                    </a:p>
+                  </a:txBody>
+                  <a:tcPr>
+                    <a:lnL w="12700" cap="flat" cmpd="sng" algn="ctr">
+                      <a:solidFill>
+                        <a:schemeClr val="tx1"/>
+                      </a:solidFill>
+                      <a:prstDash val="solid"/>
+                      <a:round/>
+                      <a:headEnd type="none" w="med" len="med"/>
+                      <a:tailEnd type="none" w="med" len="med"/>
+                    </a:lnL>
+                    <a:lnR w="12700" cap="flat" cmpd="sng" algn="ctr">
+                      <a:solidFill>
+                        <a:schemeClr val="tx1"/>
+                      </a:solidFill>
+                      <a:prstDash val="solid"/>
+                      <a:round/>
+                      <a:headEnd type="none" w="med" len="med"/>
+                      <a:tailEnd type="none" w="med" len="med"/>
+                    </a:lnR>
+                    <a:lnT w="12700" cap="flat" cmpd="sng" algn="ctr">
+                      <a:solidFill>
+                        <a:schemeClr val="tx1"/>
+                      </a:solidFill>
+                      <a:prstDash val="solid"/>
+                      <a:round/>
+                      <a:headEnd type="none" w="med" len="med"/>
+                      <a:tailEnd type="none" w="med" len="med"/>
+                    </a:lnT>
+                    <a:lnB w="12700" cap="flat" cmpd="sng" algn="ctr">
+                      <a:solidFill>
+                        <a:schemeClr val="tx1"/>
+                      </a:solidFill>
+                      <a:prstDash val="solid"/>
+                      <a:round/>
+                      <a:headEnd type="none" w="med" len="med"/>
+                      <a:tailEnd type="none" w="med" len="med"/>
+                    </a:lnB>
+                    <a:noFill/>
+                  </a:tcPr>
+                </a:tc>
+                <a:tc>
+                  <a:txBody>
+                    <a:bodyPr/>
+                    <a:lstStyle/>
+                    <a:p>
+                      <a:endParaRPr lang="en-US" dirty="0"/>
+                    </a:p>
+                  </a:txBody>
+                  <a:tcPr>
+                    <a:lnL w="12700" cap="flat" cmpd="sng" algn="ctr">
+                      <a:solidFill>
+                        <a:schemeClr val="tx1"/>
+                      </a:solidFill>
+                      <a:prstDash val="solid"/>
+                      <a:round/>
+                      <a:headEnd type="none" w="med" len="med"/>
+                      <a:tailEnd type="none" w="med" len="med"/>
+                    </a:lnL>
+                    <a:lnR w="12700" cap="flat" cmpd="sng" algn="ctr">
+                      <a:solidFill>
+                        <a:schemeClr val="tx1"/>
+                      </a:solidFill>
+                      <a:prstDash val="solid"/>
+                      <a:round/>
+                      <a:headEnd type="none" w="med" len="med"/>
+                      <a:tailEnd type="none" w="med" len="med"/>
+                    </a:lnR>
+                    <a:lnT w="12700" cap="flat" cmpd="sng" algn="ctr">
+                      <a:solidFill>
+                        <a:schemeClr val="tx1"/>
+                      </a:solidFill>
+                      <a:prstDash val="solid"/>
+                      <a:round/>
+                      <a:headEnd type="none" w="med" len="med"/>
+                      <a:tailEnd type="none" w="med" len="med"/>
+                    </a:lnT>
+                    <a:lnB w="12700" cap="flat" cmpd="sng" algn="ctr">
+                      <a:solidFill>
+                        <a:schemeClr val="tx1"/>
+                      </a:solidFill>
+                      <a:prstDash val="solid"/>
+                      <a:round/>
+                      <a:headEnd type="none" w="med" len="med"/>
+                      <a:tailEnd type="none" w="med" len="med"/>
+                    </a:lnB>
+                    <a:noFill/>
+                  </a:tcPr>
+                </a:tc>
+                <a:extLst>
+                  <a:ext uri="{0D108BD9-81ED-4DB2-BD59-A6C34878D82A}">
+                    <a16:rowId xmlns:a16="http://schemas.microsoft.com/office/drawing/2014/main" val="2235277871"/>
+                  </a:ext>
+                </a:extLst>
+              </a:tr>
+            </a:tbl>
+          </a:graphicData>
+        </a:graphic>
+      </p:graphicFrame>
+      <p:grpSp>
+        <p:nvGrpSpPr>
+          <p:cNvPr id="5" name="Group 4">
+            <a:extLst>
+              <a:ext uri="{FF2B5EF4-FFF2-40B4-BE49-F238E27FC236}">
+                <a16:creationId xmlns:a16="http://schemas.microsoft.com/office/drawing/2014/main" id="{4D6FA1D4-44AD-D54B-928E-7C220A6C6282}"/>
+              </a:ext>
+            </a:extLst>
+          </p:cNvPr>
+          <p:cNvGrpSpPr/>
+          <p:nvPr/>
+        </p:nvGrpSpPr>
+        <p:grpSpPr>
+          <a:xfrm>
+            <a:off x="7280895" y="3133327"/>
+            <a:ext cx="1056904" cy="938150"/>
+            <a:chOff x="7382495" y="2101933"/>
+            <a:chExt cx="1056904" cy="938150"/>
+          </a:xfrm>
+        </p:grpSpPr>
+        <p:sp>
+          <p:nvSpPr>
+            <p:cNvPr id="6" name="Rectangle 5">
+              <a:extLst>
+                <a:ext uri="{FF2B5EF4-FFF2-40B4-BE49-F238E27FC236}">
+                  <a16:creationId xmlns:a16="http://schemas.microsoft.com/office/drawing/2014/main" id="{C9D9FFF0-B677-734B-B636-21DC6B7D632E}"/>
+                </a:ext>
+              </a:extLst>
+            </p:cNvPr>
+            <p:cNvSpPr/>
+            <p:nvPr/>
+          </p:nvSpPr>
+          <p:spPr>
+            <a:xfrm>
+              <a:off x="7382495" y="2101933"/>
+              <a:ext cx="1056904" cy="938150"/>
+            </a:xfrm>
+            <a:prstGeom prst="rect">
+              <a:avLst/>
+            </a:prstGeom>
+            <a:solidFill>
+              <a:srgbClr val="FFFF00"/>
+            </a:solidFill>
+            <a:ln>
+              <a:solidFill>
+                <a:schemeClr val="tx1"/>
+              </a:solidFill>
+            </a:ln>
+          </p:spPr>
+          <p:style>
+            <a:lnRef idx="2">
+              <a:schemeClr val="accent1">
+                <a:shade val="50000"/>
+              </a:schemeClr>
+            </a:lnRef>
+            <a:fillRef idx="1">
+              <a:schemeClr val="accent1"/>
+            </a:fillRef>
+            <a:effectRef idx="0">
+              <a:schemeClr val="accent1"/>
+            </a:effectRef>
+            <a:fontRef idx="minor">
+              <a:schemeClr val="lt1"/>
+            </a:fontRef>
+          </p:style>
+          <p:txBody>
+            <a:bodyPr rtlCol="0" anchor="ctr"/>
+            <a:lstStyle/>
+            <a:p>
+              <a:pPr algn="ctr"/>
+              <a:endParaRPr lang="en-US" dirty="0"/>
+            </a:p>
+          </p:txBody>
+        </p:sp>
+        <p:sp>
+          <p:nvSpPr>
+            <p:cNvPr id="7" name="TextBox 6">
+              <a:extLst>
+                <a:ext uri="{FF2B5EF4-FFF2-40B4-BE49-F238E27FC236}">
+                  <a16:creationId xmlns:a16="http://schemas.microsoft.com/office/drawing/2014/main" id="{469292B5-DDA6-2E40-8AEF-6D5608DAA7D2}"/>
+                </a:ext>
+              </a:extLst>
+            </p:cNvPr>
+            <p:cNvSpPr txBox="1"/>
+            <p:nvPr/>
+          </p:nvSpPr>
+          <p:spPr>
+            <a:xfrm>
+              <a:off x="7536874" y="2340175"/>
+              <a:ext cx="748145" cy="461665"/>
+            </a:xfrm>
+            <a:prstGeom prst="rect">
+              <a:avLst/>
+            </a:prstGeom>
+            <a:noFill/>
+          </p:spPr>
+          <p:txBody>
+            <a:bodyPr wrap="square" rtlCol="0">
+              <a:spAutoFit/>
+            </a:bodyPr>
+            <a:lstStyle/>
+            <a:p>
+              <a:pPr algn="ctr"/>
+              <a:r>
+                <a:rPr lang="en-US" sz="2400" dirty="0"/>
+                <a:t>END</a:t>
+              </a:r>
+            </a:p>
+          </p:txBody>
+        </p:sp>
+      </p:grpSp>
+      <p:grpSp>
+        <p:nvGrpSpPr>
+          <p:cNvPr id="8" name="Group 7">
+            <a:extLst>
+              <a:ext uri="{FF2B5EF4-FFF2-40B4-BE49-F238E27FC236}">
+                <a16:creationId xmlns:a16="http://schemas.microsoft.com/office/drawing/2014/main" id="{841179A5-8381-BB44-BEF4-21003980206E}"/>
+              </a:ext>
+            </a:extLst>
+          </p:cNvPr>
+          <p:cNvGrpSpPr/>
+          <p:nvPr/>
+        </p:nvGrpSpPr>
+        <p:grpSpPr>
+          <a:xfrm>
+            <a:off x="5731799" y="3219677"/>
+            <a:ext cx="2444338" cy="938150"/>
+            <a:chOff x="3170712" y="2185062"/>
+            <a:chExt cx="2444338" cy="938150"/>
+          </a:xfrm>
+        </p:grpSpPr>
+        <p:sp>
+          <p:nvSpPr>
+            <p:cNvPr id="9" name="Rectangle 8">
+              <a:extLst>
+                <a:ext uri="{FF2B5EF4-FFF2-40B4-BE49-F238E27FC236}">
+                  <a16:creationId xmlns:a16="http://schemas.microsoft.com/office/drawing/2014/main" id="{F17BFAB8-B697-B14C-A5D5-2913CD8DD01B}"/>
+                </a:ext>
+              </a:extLst>
+            </p:cNvPr>
+            <p:cNvSpPr/>
+            <p:nvPr/>
+          </p:nvSpPr>
+          <p:spPr>
+            <a:xfrm>
+              <a:off x="3170712" y="2185062"/>
+              <a:ext cx="1387434" cy="938150"/>
+            </a:xfrm>
+            <a:prstGeom prst="rect">
+              <a:avLst/>
+            </a:prstGeom>
+            <a:solidFill>
+              <a:srgbClr val="FF0000"/>
+            </a:solidFill>
+            <a:ln>
+              <a:solidFill>
+                <a:schemeClr val="tx1"/>
+              </a:solidFill>
+            </a:ln>
+          </p:spPr>
+          <p:style>
+            <a:lnRef idx="2">
+              <a:schemeClr val="accent1">
+                <a:shade val="50000"/>
+              </a:schemeClr>
+            </a:lnRef>
+            <a:fillRef idx="1">
+              <a:schemeClr val="accent1"/>
+            </a:fillRef>
+            <a:effectRef idx="0">
+              <a:schemeClr val="accent1"/>
+            </a:effectRef>
+            <a:fontRef idx="minor">
+              <a:schemeClr val="lt1"/>
+            </a:fontRef>
+          </p:style>
+          <p:txBody>
+            <a:bodyPr rtlCol="0" anchor="ctr"/>
+            <a:lstStyle/>
+            <a:p>
+              <a:pPr algn="ctr"/>
+              <a:endParaRPr lang="en-US" dirty="0"/>
+            </a:p>
+          </p:txBody>
+        </p:sp>
+        <p:sp>
+          <p:nvSpPr>
+            <p:cNvPr id="10" name="Rectangle 9">
+              <a:extLst>
+                <a:ext uri="{FF2B5EF4-FFF2-40B4-BE49-F238E27FC236}">
+                  <a16:creationId xmlns:a16="http://schemas.microsoft.com/office/drawing/2014/main" id="{FEA1B07A-2AE2-3346-9C35-ACB06762E680}"/>
+                </a:ext>
+              </a:extLst>
+            </p:cNvPr>
+            <p:cNvSpPr/>
+            <p:nvPr/>
+          </p:nvSpPr>
+          <p:spPr>
+            <a:xfrm>
+              <a:off x="4558146" y="2220687"/>
+              <a:ext cx="1056904" cy="866166"/>
+            </a:xfrm>
+            <a:prstGeom prst="rect">
+              <a:avLst/>
+            </a:prstGeom>
+            <a:solidFill>
+              <a:srgbClr val="FF0000"/>
+            </a:solidFill>
+            <a:ln>
+              <a:solidFill>
+                <a:schemeClr val="tx1"/>
+              </a:solidFill>
+            </a:ln>
+          </p:spPr>
+          <p:style>
+            <a:lnRef idx="2">
+              <a:schemeClr val="accent1">
+                <a:shade val="50000"/>
+              </a:schemeClr>
+            </a:lnRef>
+            <a:fillRef idx="1">
+              <a:schemeClr val="accent1"/>
+            </a:fillRef>
+            <a:effectRef idx="0">
+              <a:schemeClr val="accent1"/>
+            </a:effectRef>
+            <a:fontRef idx="minor">
+              <a:schemeClr val="lt1"/>
+            </a:fontRef>
+          </p:style>
+          <p:txBody>
+            <a:bodyPr rtlCol="0" anchor="ctr"/>
+            <a:lstStyle/>
+            <a:p>
+              <a:pPr algn="ctr"/>
+              <a:endParaRPr lang="en-US" dirty="0"/>
+            </a:p>
+          </p:txBody>
+        </p:sp>
+      </p:grpSp>
+      <p:grpSp>
+        <p:nvGrpSpPr>
+          <p:cNvPr id="11" name="Group 10">
+            <a:extLst>
+              <a:ext uri="{FF2B5EF4-FFF2-40B4-BE49-F238E27FC236}">
+                <a16:creationId xmlns:a16="http://schemas.microsoft.com/office/drawing/2014/main" id="{04AC272A-6049-8640-BD14-4C7E68E83B72}"/>
+              </a:ext>
+            </a:extLst>
+          </p:cNvPr>
+          <p:cNvGrpSpPr/>
+          <p:nvPr/>
+        </p:nvGrpSpPr>
+        <p:grpSpPr>
+          <a:xfrm>
+            <a:off x="5819250" y="4492328"/>
+            <a:ext cx="1056904" cy="1989104"/>
+            <a:chOff x="5993080" y="2096008"/>
+            <a:chExt cx="1056904" cy="1989104"/>
+          </a:xfrm>
+        </p:grpSpPr>
+        <p:sp>
+          <p:nvSpPr>
+            <p:cNvPr id="12" name="Rectangle 11">
+              <a:extLst>
+                <a:ext uri="{FF2B5EF4-FFF2-40B4-BE49-F238E27FC236}">
+                  <a16:creationId xmlns:a16="http://schemas.microsoft.com/office/drawing/2014/main" id="{91DF5518-AA62-E94D-BE9C-4065922F51FC}"/>
+                </a:ext>
+              </a:extLst>
+            </p:cNvPr>
+            <p:cNvSpPr/>
+            <p:nvPr/>
+          </p:nvSpPr>
+          <p:spPr>
+            <a:xfrm>
+              <a:off x="6060375" y="3239004"/>
+              <a:ext cx="953984" cy="846108"/>
+            </a:xfrm>
+            <a:prstGeom prst="rect">
+              <a:avLst/>
+            </a:prstGeom>
+            <a:solidFill>
+              <a:schemeClr val="tx1"/>
+            </a:solidFill>
+            <a:ln>
+              <a:solidFill>
+                <a:schemeClr val="tx1"/>
+              </a:solidFill>
+            </a:ln>
+          </p:spPr>
+          <p:style>
+            <a:lnRef idx="2">
+              <a:schemeClr val="accent1">
+                <a:shade val="50000"/>
+              </a:schemeClr>
+            </a:lnRef>
+            <a:fillRef idx="1">
+              <a:schemeClr val="accent1"/>
+            </a:fillRef>
+            <a:effectRef idx="0">
+              <a:schemeClr val="accent1"/>
+            </a:effectRef>
+            <a:fontRef idx="minor">
+              <a:schemeClr val="lt1"/>
+            </a:fontRef>
+          </p:style>
+          <p:txBody>
+            <a:bodyPr rtlCol="0" anchor="ctr"/>
+            <a:lstStyle/>
+            <a:p>
+              <a:pPr algn="ctr"/>
+              <a:endParaRPr lang="en-US" dirty="0">
+                <a:ln>
+                  <a:solidFill>
+                    <a:srgbClr val="FFFF00"/>
+                  </a:solidFill>
+                </a:ln>
+              </a:endParaRPr>
+            </a:p>
+          </p:txBody>
+        </p:sp>
+        <p:sp>
+          <p:nvSpPr>
+            <p:cNvPr id="13" name="Rectangle 12">
+              <a:extLst>
+                <a:ext uri="{FF2B5EF4-FFF2-40B4-BE49-F238E27FC236}">
+                  <a16:creationId xmlns:a16="http://schemas.microsoft.com/office/drawing/2014/main" id="{BB7B9CA2-BF23-3E43-8ED9-46834BFEF602}"/>
+                </a:ext>
+              </a:extLst>
+            </p:cNvPr>
+            <p:cNvSpPr/>
+            <p:nvPr/>
+          </p:nvSpPr>
+          <p:spPr>
+            <a:xfrm>
+              <a:off x="5993080" y="2096008"/>
+              <a:ext cx="1056904" cy="1142996"/>
+            </a:xfrm>
+            <a:prstGeom prst="rect">
+              <a:avLst/>
+            </a:prstGeom>
+            <a:solidFill>
+              <a:schemeClr val="tx1"/>
+            </a:solidFill>
+            <a:ln>
+              <a:solidFill>
+                <a:schemeClr val="tx1"/>
+              </a:solidFill>
+            </a:ln>
+          </p:spPr>
+          <p:style>
+            <a:lnRef idx="2">
+              <a:schemeClr val="accent1">
+                <a:shade val="50000"/>
+              </a:schemeClr>
+            </a:lnRef>
+            <a:fillRef idx="1">
+              <a:schemeClr val="accent1"/>
+            </a:fillRef>
+            <a:effectRef idx="0">
+              <a:schemeClr val="accent1"/>
+            </a:effectRef>
+            <a:fontRef idx="minor">
+              <a:schemeClr val="lt1"/>
+            </a:fontRef>
+          </p:style>
+          <p:txBody>
+            <a:bodyPr rtlCol="0" anchor="ctr"/>
+            <a:lstStyle/>
+            <a:p>
+              <a:pPr algn="ctr"/>
+              <a:endParaRPr lang="en-US" dirty="0">
+                <a:ln>
+                  <a:solidFill>
+                    <a:srgbClr val="FFFF00"/>
+                  </a:solidFill>
+                </a:ln>
+              </a:endParaRPr>
+            </a:p>
+          </p:txBody>
+        </p:sp>
+      </p:grpSp>
+      <p:grpSp>
+        <p:nvGrpSpPr>
+          <p:cNvPr id="19" name="Group 18">
+            <a:extLst>
+              <a:ext uri="{FF2B5EF4-FFF2-40B4-BE49-F238E27FC236}">
+                <a16:creationId xmlns:a16="http://schemas.microsoft.com/office/drawing/2014/main" id="{5528CFE0-F570-5646-9909-8B96E1945482}"/>
+              </a:ext>
+            </a:extLst>
+          </p:cNvPr>
+          <p:cNvGrpSpPr/>
+          <p:nvPr/>
+        </p:nvGrpSpPr>
+        <p:grpSpPr>
+          <a:xfrm>
+            <a:off x="2681185" y="764306"/>
+            <a:ext cx="6053290" cy="753243"/>
+            <a:chOff x="2681185" y="764306"/>
+            <a:chExt cx="6053290" cy="753243"/>
+          </a:xfrm>
+        </p:grpSpPr>
+        <p:sp>
+          <p:nvSpPr>
+            <p:cNvPr id="15" name="TextBox 14">
+              <a:extLst>
+                <a:ext uri="{FF2B5EF4-FFF2-40B4-BE49-F238E27FC236}">
+                  <a16:creationId xmlns:a16="http://schemas.microsoft.com/office/drawing/2014/main" id="{70F8A909-87C1-5448-98E5-9DC636D00491}"/>
+                </a:ext>
+              </a:extLst>
+            </p:cNvPr>
+            <p:cNvSpPr txBox="1"/>
+            <p:nvPr/>
+          </p:nvSpPr>
+          <p:spPr>
+            <a:xfrm>
+              <a:off x="2681185" y="809663"/>
+              <a:ext cx="1909288" cy="707886"/>
+            </a:xfrm>
+            <a:prstGeom prst="rect">
+              <a:avLst/>
+            </a:prstGeom>
+            <a:noFill/>
+          </p:spPr>
+          <p:txBody>
+            <a:bodyPr wrap="square" rtlCol="0">
+              <a:spAutoFit/>
+            </a:bodyPr>
+            <a:lstStyle/>
+            <a:p>
+              <a:pPr algn="ctr"/>
+              <a:r>
+                <a:rPr lang="en-US" sz="4000" dirty="0"/>
+                <a:t>0</a:t>
+              </a:r>
+            </a:p>
+          </p:txBody>
+        </p:sp>
+        <p:sp>
+          <p:nvSpPr>
+            <p:cNvPr id="16" name="TextBox 15">
+              <a:extLst>
+                <a:ext uri="{FF2B5EF4-FFF2-40B4-BE49-F238E27FC236}">
+                  <a16:creationId xmlns:a16="http://schemas.microsoft.com/office/drawing/2014/main" id="{F10927CA-3888-7246-8AD1-7B10BDB74D48}"/>
+                </a:ext>
+              </a:extLst>
+            </p:cNvPr>
+            <p:cNvSpPr txBox="1"/>
+            <p:nvPr/>
+          </p:nvSpPr>
+          <p:spPr>
+            <a:xfrm>
+              <a:off x="4171539" y="808195"/>
+              <a:ext cx="1909288" cy="707886"/>
+            </a:xfrm>
+            <a:prstGeom prst="rect">
+              <a:avLst/>
+            </a:prstGeom>
+            <a:noFill/>
+          </p:spPr>
+          <p:txBody>
+            <a:bodyPr wrap="square" rtlCol="0">
+              <a:spAutoFit/>
+            </a:bodyPr>
+            <a:lstStyle/>
+            <a:p>
+              <a:pPr algn="ctr"/>
+              <a:r>
+                <a:rPr lang="en-US" sz="4000" dirty="0"/>
+                <a:t>1</a:t>
+              </a:r>
+            </a:p>
+          </p:txBody>
+        </p:sp>
+        <p:sp>
+          <p:nvSpPr>
+            <p:cNvPr id="17" name="TextBox 16">
+              <a:extLst>
+                <a:ext uri="{FF2B5EF4-FFF2-40B4-BE49-F238E27FC236}">
+                  <a16:creationId xmlns:a16="http://schemas.microsoft.com/office/drawing/2014/main" id="{86E5ECEA-058C-9B43-BEC0-F7574DA0EAF8}"/>
+                </a:ext>
+              </a:extLst>
+            </p:cNvPr>
+            <p:cNvSpPr txBox="1"/>
+            <p:nvPr/>
+          </p:nvSpPr>
+          <p:spPr>
+            <a:xfrm>
+              <a:off x="5481123" y="764306"/>
+              <a:ext cx="1909288" cy="707886"/>
+            </a:xfrm>
+            <a:prstGeom prst="rect">
+              <a:avLst/>
+            </a:prstGeom>
+            <a:noFill/>
+          </p:spPr>
+          <p:txBody>
+            <a:bodyPr wrap="square" rtlCol="0">
+              <a:spAutoFit/>
+            </a:bodyPr>
+            <a:lstStyle/>
+            <a:p>
+              <a:pPr algn="ctr"/>
+              <a:r>
+                <a:rPr lang="en-US" sz="4000" dirty="0"/>
+                <a:t>2</a:t>
+              </a:r>
+            </a:p>
+          </p:txBody>
+        </p:sp>
+        <p:sp>
+          <p:nvSpPr>
+            <p:cNvPr id="18" name="TextBox 17">
+              <a:extLst>
+                <a:ext uri="{FF2B5EF4-FFF2-40B4-BE49-F238E27FC236}">
+                  <a16:creationId xmlns:a16="http://schemas.microsoft.com/office/drawing/2014/main" id="{F4C40F2B-72C5-BA45-AA14-D0385FF6FC7A}"/>
+                </a:ext>
+              </a:extLst>
+            </p:cNvPr>
+            <p:cNvSpPr txBox="1"/>
+            <p:nvPr/>
+          </p:nvSpPr>
+          <p:spPr>
+            <a:xfrm>
+              <a:off x="6825187" y="768438"/>
+              <a:ext cx="1909288" cy="707886"/>
+            </a:xfrm>
+            <a:prstGeom prst="rect">
+              <a:avLst/>
+            </a:prstGeom>
+            <a:noFill/>
+          </p:spPr>
+          <p:txBody>
+            <a:bodyPr wrap="square" rtlCol="0">
+              <a:spAutoFit/>
+            </a:bodyPr>
+            <a:lstStyle/>
+            <a:p>
+              <a:pPr algn="ctr"/>
+              <a:r>
+                <a:rPr lang="en-US" sz="4000" dirty="0"/>
+                <a:t>3</a:t>
+              </a:r>
+            </a:p>
+          </p:txBody>
+        </p:sp>
+      </p:grpSp>
+      <p:grpSp>
+        <p:nvGrpSpPr>
+          <p:cNvPr id="20" name="Group 19">
+            <a:extLst>
+              <a:ext uri="{FF2B5EF4-FFF2-40B4-BE49-F238E27FC236}">
+                <a16:creationId xmlns:a16="http://schemas.microsoft.com/office/drawing/2014/main" id="{893CB830-0F4E-3247-85DE-894E8F419C3E}"/>
+              </a:ext>
+            </a:extLst>
+          </p:cNvPr>
+          <p:cNvGrpSpPr/>
+          <p:nvPr/>
+        </p:nvGrpSpPr>
+        <p:grpSpPr>
+          <a:xfrm rot="5400000">
+            <a:off x="-637816" y="3893777"/>
+            <a:ext cx="6053290" cy="753243"/>
+            <a:chOff x="2681185" y="764306"/>
+            <a:chExt cx="6053290" cy="753243"/>
+          </a:xfrm>
+        </p:grpSpPr>
+        <p:sp>
+          <p:nvSpPr>
+            <p:cNvPr id="21" name="TextBox 20">
+              <a:extLst>
+                <a:ext uri="{FF2B5EF4-FFF2-40B4-BE49-F238E27FC236}">
+                  <a16:creationId xmlns:a16="http://schemas.microsoft.com/office/drawing/2014/main" id="{B06766BD-4826-804F-9702-E6542F741591}"/>
+                </a:ext>
+              </a:extLst>
+            </p:cNvPr>
+            <p:cNvSpPr txBox="1"/>
+            <p:nvPr/>
+          </p:nvSpPr>
+          <p:spPr>
+            <a:xfrm>
+              <a:off x="2681185" y="809663"/>
+              <a:ext cx="1909288" cy="707886"/>
+            </a:xfrm>
+            <a:prstGeom prst="rect">
+              <a:avLst/>
+            </a:prstGeom>
+            <a:noFill/>
+          </p:spPr>
+          <p:txBody>
+            <a:bodyPr wrap="square" rtlCol="0">
+              <a:spAutoFit/>
+            </a:bodyPr>
+            <a:lstStyle/>
+            <a:p>
+              <a:pPr algn="ctr"/>
+              <a:r>
+                <a:rPr lang="en-US" sz="4000" dirty="0"/>
+                <a:t>0</a:t>
+              </a:r>
+            </a:p>
+          </p:txBody>
+        </p:sp>
+        <p:sp>
+          <p:nvSpPr>
+            <p:cNvPr id="22" name="TextBox 21">
+              <a:extLst>
+                <a:ext uri="{FF2B5EF4-FFF2-40B4-BE49-F238E27FC236}">
+                  <a16:creationId xmlns:a16="http://schemas.microsoft.com/office/drawing/2014/main" id="{FFF0FB17-F156-ED48-8A6D-8DBA904B7114}"/>
+                </a:ext>
+              </a:extLst>
+            </p:cNvPr>
+            <p:cNvSpPr txBox="1"/>
+            <p:nvPr/>
+          </p:nvSpPr>
+          <p:spPr>
+            <a:xfrm>
+              <a:off x="4171539" y="808195"/>
+              <a:ext cx="1909288" cy="707886"/>
+            </a:xfrm>
+            <a:prstGeom prst="rect">
+              <a:avLst/>
+            </a:prstGeom>
+            <a:noFill/>
+          </p:spPr>
+          <p:txBody>
+            <a:bodyPr wrap="square" rtlCol="0">
+              <a:spAutoFit/>
+            </a:bodyPr>
+            <a:lstStyle/>
+            <a:p>
+              <a:pPr algn="ctr"/>
+              <a:r>
+                <a:rPr lang="en-US" sz="4000" dirty="0"/>
+                <a:t>1</a:t>
+              </a:r>
+            </a:p>
+          </p:txBody>
+        </p:sp>
+        <p:sp>
+          <p:nvSpPr>
+            <p:cNvPr id="23" name="TextBox 22">
+              <a:extLst>
+                <a:ext uri="{FF2B5EF4-FFF2-40B4-BE49-F238E27FC236}">
+                  <a16:creationId xmlns:a16="http://schemas.microsoft.com/office/drawing/2014/main" id="{E154A1EB-371E-8146-8D56-47AAAE0E50ED}"/>
+                </a:ext>
+              </a:extLst>
+            </p:cNvPr>
+            <p:cNvSpPr txBox="1"/>
+            <p:nvPr/>
+          </p:nvSpPr>
+          <p:spPr>
+            <a:xfrm>
+              <a:off x="5481123" y="764306"/>
+              <a:ext cx="1909288" cy="707886"/>
+            </a:xfrm>
+            <a:prstGeom prst="rect">
+              <a:avLst/>
+            </a:prstGeom>
+            <a:noFill/>
+          </p:spPr>
+          <p:txBody>
+            <a:bodyPr wrap="square" rtlCol="0">
+              <a:spAutoFit/>
+            </a:bodyPr>
+            <a:lstStyle/>
+            <a:p>
+              <a:pPr algn="ctr"/>
+              <a:r>
+                <a:rPr lang="en-US" sz="4000" dirty="0"/>
+                <a:t>2</a:t>
+              </a:r>
+            </a:p>
+          </p:txBody>
+        </p:sp>
+        <p:sp>
+          <p:nvSpPr>
+            <p:cNvPr id="24" name="TextBox 23">
+              <a:extLst>
+                <a:ext uri="{FF2B5EF4-FFF2-40B4-BE49-F238E27FC236}">
+                  <a16:creationId xmlns:a16="http://schemas.microsoft.com/office/drawing/2014/main" id="{B7559B7B-4B51-1844-9877-F11D30832B3E}"/>
+                </a:ext>
+              </a:extLst>
+            </p:cNvPr>
+            <p:cNvSpPr txBox="1"/>
+            <p:nvPr/>
+          </p:nvSpPr>
+          <p:spPr>
+            <a:xfrm>
+              <a:off x="6825187" y="768438"/>
+              <a:ext cx="1909288" cy="707886"/>
+            </a:xfrm>
+            <a:prstGeom prst="rect">
+              <a:avLst/>
+            </a:prstGeom>
+            <a:noFill/>
+          </p:spPr>
+          <p:txBody>
+            <a:bodyPr wrap="square" rtlCol="0">
+              <a:spAutoFit/>
+            </a:bodyPr>
+            <a:lstStyle/>
+            <a:p>
+              <a:pPr algn="ctr"/>
+              <a:r>
+                <a:rPr lang="en-US" sz="4000" dirty="0"/>
+                <a:t>3</a:t>
+              </a:r>
+            </a:p>
+          </p:txBody>
+        </p:sp>
+      </p:grpSp>
+      <p:grpSp>
+        <p:nvGrpSpPr>
+          <p:cNvPr id="25" name="Group 24">
+            <a:extLst>
+              <a:ext uri="{FF2B5EF4-FFF2-40B4-BE49-F238E27FC236}">
+                <a16:creationId xmlns:a16="http://schemas.microsoft.com/office/drawing/2014/main" id="{B9CF5F4D-973D-D349-B6C1-1FA67E9E23DF}"/>
+              </a:ext>
+            </a:extLst>
+          </p:cNvPr>
+          <p:cNvGrpSpPr/>
+          <p:nvPr/>
+        </p:nvGrpSpPr>
+        <p:grpSpPr>
+          <a:xfrm>
+            <a:off x="7126515" y="4393204"/>
+            <a:ext cx="1056904" cy="1989104"/>
+            <a:chOff x="5993080" y="2096008"/>
+            <a:chExt cx="1056904" cy="1989104"/>
+          </a:xfrm>
+        </p:grpSpPr>
+        <p:sp>
+          <p:nvSpPr>
+            <p:cNvPr id="26" name="Rectangle 25">
+              <a:extLst>
+                <a:ext uri="{FF2B5EF4-FFF2-40B4-BE49-F238E27FC236}">
+                  <a16:creationId xmlns:a16="http://schemas.microsoft.com/office/drawing/2014/main" id="{B2A00566-8C09-1C44-B72C-0569FBF0EA05}"/>
+                </a:ext>
+              </a:extLst>
+            </p:cNvPr>
+            <p:cNvSpPr/>
+            <p:nvPr/>
+          </p:nvSpPr>
+          <p:spPr>
+            <a:xfrm>
+              <a:off x="6060375" y="3239004"/>
+              <a:ext cx="953984" cy="846108"/>
+            </a:xfrm>
+            <a:prstGeom prst="rect">
+              <a:avLst/>
+            </a:prstGeom>
+            <a:solidFill>
+              <a:schemeClr val="tx1"/>
+            </a:solidFill>
+            <a:ln>
+              <a:solidFill>
+                <a:schemeClr val="tx1"/>
+              </a:solidFill>
+            </a:ln>
+          </p:spPr>
+          <p:style>
+            <a:lnRef idx="2">
+              <a:schemeClr val="accent1">
+                <a:shade val="50000"/>
+              </a:schemeClr>
+            </a:lnRef>
+            <a:fillRef idx="1">
+              <a:schemeClr val="accent1"/>
+            </a:fillRef>
+            <a:effectRef idx="0">
+              <a:schemeClr val="accent1"/>
+            </a:effectRef>
+            <a:fontRef idx="minor">
+              <a:schemeClr val="lt1"/>
+            </a:fontRef>
+          </p:style>
+          <p:txBody>
+            <a:bodyPr rtlCol="0" anchor="ctr"/>
+            <a:lstStyle/>
+            <a:p>
+              <a:pPr algn="ctr"/>
+              <a:endParaRPr lang="en-US" dirty="0">
+                <a:ln>
+                  <a:solidFill>
+                    <a:srgbClr val="FFFF00"/>
+                  </a:solidFill>
+                </a:ln>
+              </a:endParaRPr>
+            </a:p>
+          </p:txBody>
+        </p:sp>
+        <p:sp>
+          <p:nvSpPr>
+            <p:cNvPr id="27" name="Rectangle 26">
+              <a:extLst>
+                <a:ext uri="{FF2B5EF4-FFF2-40B4-BE49-F238E27FC236}">
+                  <a16:creationId xmlns:a16="http://schemas.microsoft.com/office/drawing/2014/main" id="{994903F8-1959-3543-9910-71E04BED852C}"/>
+                </a:ext>
+              </a:extLst>
+            </p:cNvPr>
+            <p:cNvSpPr/>
+            <p:nvPr/>
+          </p:nvSpPr>
+          <p:spPr>
+            <a:xfrm>
+              <a:off x="5993080" y="2096008"/>
+              <a:ext cx="1056904" cy="1142996"/>
+            </a:xfrm>
+            <a:prstGeom prst="rect">
+              <a:avLst/>
+            </a:prstGeom>
+            <a:solidFill>
+              <a:schemeClr val="tx1"/>
+            </a:solidFill>
+            <a:ln>
+              <a:solidFill>
+                <a:schemeClr val="tx1"/>
+              </a:solidFill>
+            </a:ln>
+          </p:spPr>
+          <p:style>
+            <a:lnRef idx="2">
+              <a:schemeClr val="accent1">
+                <a:shade val="50000"/>
+              </a:schemeClr>
+            </a:lnRef>
+            <a:fillRef idx="1">
+              <a:schemeClr val="accent1"/>
+            </a:fillRef>
+            <a:effectRef idx="0">
+              <a:schemeClr val="accent1"/>
+            </a:effectRef>
+            <a:fontRef idx="minor">
+              <a:schemeClr val="lt1"/>
+            </a:fontRef>
+          </p:style>
+          <p:txBody>
+            <a:bodyPr rtlCol="0" anchor="ctr"/>
+            <a:lstStyle/>
+            <a:p>
+              <a:pPr algn="ctr"/>
+              <a:endParaRPr lang="en-US" dirty="0">
+                <a:ln>
+                  <a:solidFill>
+                    <a:srgbClr val="FFFF00"/>
+                  </a:solidFill>
+                </a:ln>
+              </a:endParaRPr>
+            </a:p>
+          </p:txBody>
+        </p:sp>
+      </p:grpSp>
+      <p:grpSp>
+        <p:nvGrpSpPr>
+          <p:cNvPr id="28" name="Group 27">
+            <a:extLst>
+              <a:ext uri="{FF2B5EF4-FFF2-40B4-BE49-F238E27FC236}">
+                <a16:creationId xmlns:a16="http://schemas.microsoft.com/office/drawing/2014/main" id="{11438F5F-7093-6E45-A776-CE62DF602D59}"/>
+              </a:ext>
+            </a:extLst>
+          </p:cNvPr>
+          <p:cNvGrpSpPr/>
+          <p:nvPr/>
+        </p:nvGrpSpPr>
+        <p:grpSpPr>
+          <a:xfrm rot="16200000">
+            <a:off x="3643087" y="4958428"/>
+            <a:ext cx="1056904" cy="1989104"/>
+            <a:chOff x="5993080" y="2096008"/>
+            <a:chExt cx="1056904" cy="1989104"/>
+          </a:xfrm>
+        </p:grpSpPr>
+        <p:sp>
+          <p:nvSpPr>
+            <p:cNvPr id="29" name="Rectangle 28">
+              <a:extLst>
+                <a:ext uri="{FF2B5EF4-FFF2-40B4-BE49-F238E27FC236}">
+                  <a16:creationId xmlns:a16="http://schemas.microsoft.com/office/drawing/2014/main" id="{F294E199-87AA-7A4F-A24D-42921A3FE495}"/>
+                </a:ext>
+              </a:extLst>
+            </p:cNvPr>
+            <p:cNvSpPr/>
+            <p:nvPr/>
+          </p:nvSpPr>
+          <p:spPr>
+            <a:xfrm>
+              <a:off x="6060375" y="3239004"/>
+              <a:ext cx="953984" cy="846108"/>
+            </a:xfrm>
+            <a:prstGeom prst="rect">
+              <a:avLst/>
+            </a:prstGeom>
+            <a:solidFill>
+              <a:schemeClr val="tx1"/>
+            </a:solidFill>
+            <a:ln>
+              <a:solidFill>
+                <a:schemeClr val="tx1"/>
+              </a:solidFill>
+            </a:ln>
+          </p:spPr>
+          <p:style>
+            <a:lnRef idx="2">
+              <a:schemeClr val="accent1">
+                <a:shade val="50000"/>
+              </a:schemeClr>
+            </a:lnRef>
+            <a:fillRef idx="1">
+              <a:schemeClr val="accent1"/>
+            </a:fillRef>
+            <a:effectRef idx="0">
+              <a:schemeClr val="accent1"/>
+            </a:effectRef>
+            <a:fontRef idx="minor">
+              <a:schemeClr val="lt1"/>
+            </a:fontRef>
+          </p:style>
+          <p:txBody>
+            <a:bodyPr rtlCol="0" anchor="ctr"/>
+            <a:lstStyle/>
+            <a:p>
+              <a:pPr algn="ctr"/>
+              <a:endParaRPr lang="en-US" dirty="0">
+                <a:ln>
+                  <a:solidFill>
+                    <a:srgbClr val="FFFF00"/>
+                  </a:solidFill>
+                </a:ln>
+              </a:endParaRPr>
+            </a:p>
+          </p:txBody>
+        </p:sp>
+        <p:sp>
+          <p:nvSpPr>
+            <p:cNvPr id="30" name="Rectangle 29">
+              <a:extLst>
+                <a:ext uri="{FF2B5EF4-FFF2-40B4-BE49-F238E27FC236}">
+                  <a16:creationId xmlns:a16="http://schemas.microsoft.com/office/drawing/2014/main" id="{B5A57FAC-9B58-0641-B94F-6088937C2E64}"/>
+                </a:ext>
+              </a:extLst>
+            </p:cNvPr>
+            <p:cNvSpPr/>
+            <p:nvPr/>
+          </p:nvSpPr>
+          <p:spPr>
+            <a:xfrm>
+              <a:off x="5993080" y="2096008"/>
+              <a:ext cx="1056904" cy="1142996"/>
+            </a:xfrm>
+            <a:prstGeom prst="rect">
+              <a:avLst/>
+            </a:prstGeom>
+            <a:solidFill>
+              <a:schemeClr val="tx1"/>
+            </a:solidFill>
+            <a:ln>
+              <a:solidFill>
+                <a:schemeClr val="tx1"/>
+              </a:solidFill>
+            </a:ln>
+          </p:spPr>
+          <p:style>
+            <a:lnRef idx="2">
+              <a:schemeClr val="accent1">
+                <a:shade val="50000"/>
+              </a:schemeClr>
+            </a:lnRef>
+            <a:fillRef idx="1">
+              <a:schemeClr val="accent1"/>
+            </a:fillRef>
+            <a:effectRef idx="0">
+              <a:schemeClr val="accent1"/>
+            </a:effectRef>
+            <a:fontRef idx="minor">
+              <a:schemeClr val="lt1"/>
+            </a:fontRef>
+          </p:style>
+          <p:txBody>
+            <a:bodyPr rtlCol="0" anchor="ctr"/>
+            <a:lstStyle/>
+            <a:p>
+              <a:pPr algn="ctr"/>
+              <a:endParaRPr lang="en-US" dirty="0">
+                <a:ln>
+                  <a:solidFill>
+                    <a:srgbClr val="FFFF00"/>
+                  </a:solidFill>
+                </a:ln>
+              </a:endParaRPr>
+            </a:p>
+          </p:txBody>
+        </p:sp>
+      </p:grpSp>
+    </p:spTree>
+    <p:extLst>
+      <p:ext uri="{BB962C8B-B14F-4D97-AF65-F5344CB8AC3E}">
+        <p14:creationId xmlns:p14="http://schemas.microsoft.com/office/powerpoint/2010/main" val="3254495555"/>
       </p:ext>
     </p:extLst>
   </p:cSld>

</xml_diff>